<commit_message>
Minor tweak to the architectural picture
</commit_message>
<xml_diff>
--- a/pictures/fargate-secrets-management-example.pptx
+++ b/pictures/fargate-secrets-management-example.pptx
@@ -5,7 +5,7 @@
     <p:sldMasterId id="2147483648" r:id="rId1"/>
   </p:sldMasterIdLst>
   <p:sldIdLst>
-    <p:sldId id="256" r:id="rId2"/>
+    <p:sldId id="257" r:id="rId2"/>
   </p:sldIdLst>
   <p:sldSz cx="12192000" cy="6858000"/>
   <p:notesSz cx="6858000" cy="9144000"/>
@@ -104,6 +104,11 @@
       </a:defRPr>
     </a:lvl9pPr>
   </p:defaultTextStyle>
+  <p:extLst>
+    <p:ext uri="{EFAFB233-063F-42B5-8137-9DF3F51BA10A}">
+      <p15:sldGuideLst xmlns:p15="http://schemas.microsoft.com/office/powerpoint/2012/main"/>
+    </p:ext>
+  </p:extLst>
 </p:presentation>
 </file>
 
@@ -254,7 +259,7 @@
           <a:p>
             <a:fld id="{49D30F10-A85C-F440-95DF-FCAAECEF3022}" type="datetimeFigureOut">
               <a:rPr lang="en-US" smtClean="0"/>
-              <a:t>5/16/19</a:t>
+              <a:t>5/23/19</a:t>
             </a:fld>
             <a:endParaRPr lang="en-US"/>
           </a:p>
@@ -452,7 +457,7 @@
           <a:p>
             <a:fld id="{49D30F10-A85C-F440-95DF-FCAAECEF3022}" type="datetimeFigureOut">
               <a:rPr lang="en-US" smtClean="0"/>
-              <a:t>5/16/19</a:t>
+              <a:t>5/23/19</a:t>
             </a:fld>
             <a:endParaRPr lang="en-US"/>
           </a:p>
@@ -660,7 +665,7 @@
           <a:p>
             <a:fld id="{49D30F10-A85C-F440-95DF-FCAAECEF3022}" type="datetimeFigureOut">
               <a:rPr lang="en-US" smtClean="0"/>
-              <a:t>5/16/19</a:t>
+              <a:t>5/23/19</a:t>
             </a:fld>
             <a:endParaRPr lang="en-US"/>
           </a:p>
@@ -858,7 +863,7 @@
           <a:p>
             <a:fld id="{49D30F10-A85C-F440-95DF-FCAAECEF3022}" type="datetimeFigureOut">
               <a:rPr lang="en-US" smtClean="0"/>
-              <a:t>5/16/19</a:t>
+              <a:t>5/23/19</a:t>
             </a:fld>
             <a:endParaRPr lang="en-US"/>
           </a:p>
@@ -1133,7 +1138,7 @@
           <a:p>
             <a:fld id="{49D30F10-A85C-F440-95DF-FCAAECEF3022}" type="datetimeFigureOut">
               <a:rPr lang="en-US" smtClean="0"/>
-              <a:t>5/16/19</a:t>
+              <a:t>5/23/19</a:t>
             </a:fld>
             <a:endParaRPr lang="en-US"/>
           </a:p>
@@ -1398,7 +1403,7 @@
           <a:p>
             <a:fld id="{49D30F10-A85C-F440-95DF-FCAAECEF3022}" type="datetimeFigureOut">
               <a:rPr lang="en-US" smtClean="0"/>
-              <a:t>5/16/19</a:t>
+              <a:t>5/23/19</a:t>
             </a:fld>
             <a:endParaRPr lang="en-US"/>
           </a:p>
@@ -1810,7 +1815,7 @@
           <a:p>
             <a:fld id="{49D30F10-A85C-F440-95DF-FCAAECEF3022}" type="datetimeFigureOut">
               <a:rPr lang="en-US" smtClean="0"/>
-              <a:t>5/16/19</a:t>
+              <a:t>5/23/19</a:t>
             </a:fld>
             <a:endParaRPr lang="en-US"/>
           </a:p>
@@ -1951,7 +1956,7 @@
           <a:p>
             <a:fld id="{49D30F10-A85C-F440-95DF-FCAAECEF3022}" type="datetimeFigureOut">
               <a:rPr lang="en-US" smtClean="0"/>
-              <a:t>5/16/19</a:t>
+              <a:t>5/23/19</a:t>
             </a:fld>
             <a:endParaRPr lang="en-US"/>
           </a:p>
@@ -2064,7 +2069,7 @@
           <a:p>
             <a:fld id="{49D30F10-A85C-F440-95DF-FCAAECEF3022}" type="datetimeFigureOut">
               <a:rPr lang="en-US" smtClean="0"/>
-              <a:t>5/16/19</a:t>
+              <a:t>5/23/19</a:t>
             </a:fld>
             <a:endParaRPr lang="en-US"/>
           </a:p>
@@ -2375,7 +2380,7 @@
           <a:p>
             <a:fld id="{49D30F10-A85C-F440-95DF-FCAAECEF3022}" type="datetimeFigureOut">
               <a:rPr lang="en-US" smtClean="0"/>
-              <a:t>5/16/19</a:t>
+              <a:t>5/23/19</a:t>
             </a:fld>
             <a:endParaRPr lang="en-US"/>
           </a:p>
@@ -2663,7 +2668,7 @@
           <a:p>
             <a:fld id="{49D30F10-A85C-F440-95DF-FCAAECEF3022}" type="datetimeFigureOut">
               <a:rPr lang="en-US" smtClean="0"/>
-              <a:t>5/16/19</a:t>
+              <a:t>5/23/19</a:t>
             </a:fld>
             <a:endParaRPr lang="en-US"/>
           </a:p>
@@ -2904,7 +2909,7 @@
           <a:p>
             <a:fld id="{49D30F10-A85C-F440-95DF-FCAAECEF3022}" type="datetimeFigureOut">
               <a:rPr lang="en-US" smtClean="0"/>
-              <a:t>5/16/19</a:t>
+              <a:t>5/23/19</a:t>
             </a:fld>
             <a:endParaRPr lang="en-US"/>
           </a:p>
@@ -3323,10 +3328,10 @@
       </p:grpSpPr>
       <p:grpSp>
         <p:nvGrpSpPr>
-          <p:cNvPr id="105" name="Group 104">
-            <a:extLst>
-              <a:ext uri="{FF2B5EF4-FFF2-40B4-BE49-F238E27FC236}">
-                <a16:creationId xmlns:a16="http://schemas.microsoft.com/office/drawing/2014/main" id="{02302A95-740A-1E47-84DD-ABB204C87F53}"/>
+          <p:cNvPr id="56" name="Group 55">
+            <a:extLst>
+              <a:ext uri="{FF2B5EF4-FFF2-40B4-BE49-F238E27FC236}">
+                <a16:creationId xmlns:a16="http://schemas.microsoft.com/office/drawing/2014/main" id="{7C7835A0-5274-0C4B-8CB4-0598FD413A89}"/>
               </a:ext>
             </a:extLst>
           </p:cNvPr>
@@ -3335,18 +3340,18 @@
         </p:nvGrpSpPr>
         <p:grpSpPr>
           <a:xfrm>
-            <a:off x="4434639" y="3849581"/>
-            <a:ext cx="1918253" cy="935111"/>
+            <a:off x="4053863" y="4237192"/>
+            <a:ext cx="2301904" cy="1103590"/>
             <a:chOff x="3140733" y="4058667"/>
-            <a:chExt cx="2301904" cy="1122134"/>
+            <a:chExt cx="2301904" cy="1103590"/>
           </a:xfrm>
         </p:grpSpPr>
         <p:sp>
           <p:nvSpPr>
-            <p:cNvPr id="106" name="TextBox 105">
+            <p:cNvPr id="57" name="TextBox 56">
               <a:extLst>
                 <a:ext uri="{FF2B5EF4-FFF2-40B4-BE49-F238E27FC236}">
-                  <a16:creationId xmlns:a16="http://schemas.microsoft.com/office/drawing/2014/main" id="{586DF75E-DD42-D348-9DCB-C0B8CA9A34D3}"/>
+                  <a16:creationId xmlns:a16="http://schemas.microsoft.com/office/drawing/2014/main" id="{8B16396E-BD62-0942-9AFA-EEB46A165FE6}"/>
                 </a:ext>
               </a:extLst>
             </p:cNvPr>
@@ -3356,7 +3361,7 @@
           <p:spPr>
             <a:xfrm>
               <a:off x="3140733" y="4854480"/>
-              <a:ext cx="2301904" cy="326321"/>
+              <a:ext cx="2301904" cy="307777"/>
             </a:xfrm>
             <a:prstGeom prst="rect">
               <a:avLst/>
@@ -3369,9 +3374,9 @@
             </a:bodyPr>
             <a:lstStyle/>
             <a:p>
-              <a:pPr algn="ctr" defTabSz="914307"/>
+              <a:pPr algn="ctr" defTabSz="1097212"/>
               <a:r>
-                <a:rPr lang="en-US" sz="1167" dirty="0">
+                <a:rPr lang="en-US" sz="1400" dirty="0">
                   <a:solidFill>
                     <a:srgbClr val="000000"/>
                   </a:solidFill>
@@ -3384,10 +3389,10 @@
         </p:sp>
         <p:pic>
           <p:nvPicPr>
-            <p:cNvPr id="107" name="Graphic 106">
+            <p:cNvPr id="58" name="Graphic 57">
               <a:extLst>
                 <a:ext uri="{FF2B5EF4-FFF2-40B4-BE49-F238E27FC236}">
-                  <a16:creationId xmlns:a16="http://schemas.microsoft.com/office/drawing/2014/main" id="{2819AE8F-6B7B-6948-8E7A-1771D3B69D44}"/>
+                  <a16:creationId xmlns:a16="http://schemas.microsoft.com/office/drawing/2014/main" id="{7FBB1C0C-2FBA-A143-AA9F-E4C02E743318}"/>
                 </a:ext>
               </a:extLst>
             </p:cNvPr>
@@ -3421,10 +3426,10 @@
       </p:grpSp>
       <p:grpSp>
         <p:nvGrpSpPr>
-          <p:cNvPr id="108" name="Group 107">
-            <a:extLst>
-              <a:ext uri="{FF2B5EF4-FFF2-40B4-BE49-F238E27FC236}">
-                <a16:creationId xmlns:a16="http://schemas.microsoft.com/office/drawing/2014/main" id="{C2CA2A88-1AFE-CC4D-B2DF-720AFE407896}"/>
+          <p:cNvPr id="59" name="Group 58">
+            <a:extLst>
+              <a:ext uri="{FF2B5EF4-FFF2-40B4-BE49-F238E27FC236}">
+                <a16:creationId xmlns:a16="http://schemas.microsoft.com/office/drawing/2014/main" id="{C3038882-2F76-EF47-B737-F68AF3D34347}"/>
               </a:ext>
             </a:extLst>
           </p:cNvPr>
@@ -3433,18 +3438,18 @@
         </p:nvGrpSpPr>
         <p:grpSpPr>
           <a:xfrm>
-            <a:off x="7467924" y="4313241"/>
-            <a:ext cx="1918253" cy="1462820"/>
+            <a:off x="7693804" y="4793583"/>
+            <a:ext cx="2301904" cy="1736841"/>
             <a:chOff x="9979762" y="3425416"/>
-            <a:chExt cx="2301904" cy="1755385"/>
+            <a:chExt cx="2301904" cy="1736841"/>
           </a:xfrm>
         </p:grpSpPr>
         <p:grpSp>
           <p:nvGrpSpPr>
-            <p:cNvPr id="109" name="Group 108">
+            <p:cNvPr id="60" name="Group 59">
               <a:extLst>
                 <a:ext uri="{FF2B5EF4-FFF2-40B4-BE49-F238E27FC236}">
-                  <a16:creationId xmlns:a16="http://schemas.microsoft.com/office/drawing/2014/main" id="{7953583C-6484-994F-939D-187EDB6AB368}"/>
+                  <a16:creationId xmlns:a16="http://schemas.microsoft.com/office/drawing/2014/main" id="{1C074CA3-725E-C941-84CF-E13DE685FD22}"/>
                 </a:ext>
               </a:extLst>
             </p:cNvPr>
@@ -3454,17 +3459,17 @@
           <p:grpSpPr>
             <a:xfrm>
               <a:off x="9979762" y="4148067"/>
-              <a:ext cx="2301904" cy="1032734"/>
+              <a:ext cx="2301904" cy="1014190"/>
               <a:chOff x="6634978" y="1086275"/>
-              <a:chExt cx="2301904" cy="1032734"/>
+              <a:chExt cx="2301904" cy="1014190"/>
             </a:xfrm>
           </p:grpSpPr>
           <p:sp>
             <p:nvSpPr>
-              <p:cNvPr id="112" name="TextBox 111">
+              <p:cNvPr id="63" name="TextBox 62">
                 <a:extLst>
                   <a:ext uri="{FF2B5EF4-FFF2-40B4-BE49-F238E27FC236}">
-                    <a16:creationId xmlns:a16="http://schemas.microsoft.com/office/drawing/2014/main" id="{842BB05B-9DCF-A84F-A92F-AA571E544B88}"/>
+                    <a16:creationId xmlns:a16="http://schemas.microsoft.com/office/drawing/2014/main" id="{42B08A03-8AAE-AD41-82B0-ECC31CEDB6DC}"/>
                   </a:ext>
                 </a:extLst>
               </p:cNvPr>
@@ -3474,7 +3479,7 @@
             <p:spPr>
               <a:xfrm>
                 <a:off x="6634978" y="1792688"/>
-                <a:ext cx="2301904" cy="326321"/>
+                <a:ext cx="2301904" cy="307777"/>
               </a:xfrm>
               <a:prstGeom prst="rect">
                 <a:avLst/>
@@ -3487,9 +3492,9 @@
               </a:bodyPr>
               <a:lstStyle/>
               <a:p>
-                <a:pPr algn="ctr" defTabSz="914307"/>
+                <a:pPr algn="ctr" defTabSz="1097212"/>
                 <a:r>
-                  <a:rPr lang="en-US" sz="1167" dirty="0">
+                  <a:rPr lang="en-US" sz="1400" dirty="0">
                     <a:solidFill>
                       <a:srgbClr val="000000"/>
                     </a:solidFill>
@@ -3502,10 +3507,10 @@
           </p:sp>
           <p:pic>
             <p:nvPicPr>
-              <p:cNvPr id="113" name="Graphic 112">
+              <p:cNvPr id="64" name="Graphic 63">
                 <a:extLst>
                   <a:ext uri="{FF2B5EF4-FFF2-40B4-BE49-F238E27FC236}">
-                    <a16:creationId xmlns:a16="http://schemas.microsoft.com/office/drawing/2014/main" id="{1933DE2B-ADE5-5B40-8B14-618A9082A3DC}"/>
+                    <a16:creationId xmlns:a16="http://schemas.microsoft.com/office/drawing/2014/main" id="{961EDE57-876F-8443-949D-C2C5270EBE67}"/>
                   </a:ext>
                 </a:extLst>
               </p:cNvPr>
@@ -3539,10 +3544,10 @@
         </p:grpSp>
         <p:sp>
           <p:nvSpPr>
-            <p:cNvPr id="110" name="TextBox 109">
+            <p:cNvPr id="61" name="TextBox 60">
               <a:extLst>
                 <a:ext uri="{FF2B5EF4-FFF2-40B4-BE49-F238E27FC236}">
-                  <a16:creationId xmlns:a16="http://schemas.microsoft.com/office/drawing/2014/main" id="{6A3E77E3-A769-8D41-9B9D-CF32A524E6BE}"/>
+                  <a16:creationId xmlns:a16="http://schemas.microsoft.com/office/drawing/2014/main" id="{AE31D5F2-31B2-2F4E-A643-7FFD483C9764}"/>
                 </a:ext>
               </a:extLst>
             </p:cNvPr>
@@ -3551,8 +3556,8 @@
           </p:nvSpPr>
           <p:spPr>
             <a:xfrm>
-              <a:off x="10346205" y="3871067"/>
-              <a:ext cx="1506552" cy="295465"/>
+              <a:off x="10346205" y="3871068"/>
+              <a:ext cx="1506552" cy="276999"/>
             </a:xfrm>
             <a:prstGeom prst="rect">
               <a:avLst/>
@@ -3565,9 +3570,9 @@
             </a:bodyPr>
             <a:lstStyle/>
             <a:p>
-              <a:pPr algn="ctr" defTabSz="914307"/>
+              <a:pPr algn="ctr" defTabSz="1097212"/>
               <a:r>
-                <a:rPr lang="en-US" sz="1000" dirty="0">
+                <a:rPr lang="en-US" sz="1200" dirty="0">
                   <a:solidFill>
                     <a:srgbClr val="000000"/>
                   </a:solidFill>
@@ -3580,10 +3585,10 @@
         </p:sp>
         <p:pic>
           <p:nvPicPr>
-            <p:cNvPr id="111" name="Graphic 110">
+            <p:cNvPr id="62" name="Graphic 61">
               <a:extLst>
                 <a:ext uri="{FF2B5EF4-FFF2-40B4-BE49-F238E27FC236}">
-                  <a16:creationId xmlns:a16="http://schemas.microsoft.com/office/drawing/2014/main" id="{F0BC807E-B3E0-4049-A02A-1766CC0129B4}"/>
+                  <a16:creationId xmlns:a16="http://schemas.microsoft.com/office/drawing/2014/main" id="{36E2A566-725D-744C-8041-7BD9F5666BB0}"/>
                 </a:ext>
               </a:extLst>
             </p:cNvPr>
@@ -3617,10 +3622,10 @@
       </p:grpSp>
       <p:grpSp>
         <p:nvGrpSpPr>
-          <p:cNvPr id="114" name="Group 113">
-            <a:extLst>
-              <a:ext uri="{FF2B5EF4-FFF2-40B4-BE49-F238E27FC236}">
-                <a16:creationId xmlns:a16="http://schemas.microsoft.com/office/drawing/2014/main" id="{8248B9D2-4C2F-7648-8EB2-9BF632E49836}"/>
+          <p:cNvPr id="65" name="Group 64">
+            <a:extLst>
+              <a:ext uri="{FF2B5EF4-FFF2-40B4-BE49-F238E27FC236}">
+                <a16:creationId xmlns:a16="http://schemas.microsoft.com/office/drawing/2014/main" id="{BBF671CA-1395-F449-93ED-DF02D88FEE4D}"/>
               </a:ext>
             </a:extLst>
           </p:cNvPr>
@@ -3629,18 +3634,18 @@
         </p:nvGrpSpPr>
         <p:grpSpPr>
           <a:xfrm>
-            <a:off x="3198419" y="635118"/>
-            <a:ext cx="1918253" cy="1056055"/>
+            <a:off x="2570398" y="379834"/>
+            <a:ext cx="2301904" cy="1267266"/>
             <a:chOff x="2906949" y="332068"/>
             <a:chExt cx="2301904" cy="1267266"/>
           </a:xfrm>
         </p:grpSpPr>
         <p:sp>
           <p:nvSpPr>
-            <p:cNvPr id="115" name="TextBox 114">
+            <p:cNvPr id="66" name="TextBox 65">
               <a:extLst>
                 <a:ext uri="{FF2B5EF4-FFF2-40B4-BE49-F238E27FC236}">
-                  <a16:creationId xmlns:a16="http://schemas.microsoft.com/office/drawing/2014/main" id="{B466FB61-8AE9-6649-8579-C8D9F2F5B6E1}"/>
+                  <a16:creationId xmlns:a16="http://schemas.microsoft.com/office/drawing/2014/main" id="{B00BBC45-DA36-3541-A528-7C32A3F48806}"/>
                 </a:ext>
               </a:extLst>
             </p:cNvPr>
@@ -3650,7 +3655,7 @@
           <p:spPr>
             <a:xfrm>
               <a:off x="2906949" y="332068"/>
-              <a:ext cx="2301904" cy="541841"/>
+              <a:ext cx="2301904" cy="523220"/>
             </a:xfrm>
             <a:prstGeom prst="rect">
               <a:avLst/>
@@ -3663,9 +3668,9 @@
             </a:bodyPr>
             <a:lstStyle/>
             <a:p>
-              <a:pPr algn="ctr" defTabSz="914307"/>
+              <a:pPr algn="ctr" defTabSz="1097212"/>
               <a:r>
-                <a:rPr lang="en-US" sz="1167" dirty="0">
+                <a:rPr lang="en-US" sz="1400" dirty="0">
                   <a:solidFill>
                     <a:srgbClr val="000000"/>
                   </a:solidFill>
@@ -3678,10 +3683,10 @@
         </p:sp>
         <p:pic>
           <p:nvPicPr>
-            <p:cNvPr id="116" name="Graphic 115">
+            <p:cNvPr id="67" name="Graphic 66">
               <a:extLst>
                 <a:ext uri="{FF2B5EF4-FFF2-40B4-BE49-F238E27FC236}">
-                  <a16:creationId xmlns:a16="http://schemas.microsoft.com/office/drawing/2014/main" id="{28D6C76B-13B5-C042-9EE3-ECBA6E996D68}"/>
+                  <a16:creationId xmlns:a16="http://schemas.microsoft.com/office/drawing/2014/main" id="{187E204E-3251-1E4C-A3FB-48B87C12A0E3}"/>
                 </a:ext>
               </a:extLst>
             </p:cNvPr>
@@ -3715,10 +3720,10 @@
       </p:grpSp>
       <p:grpSp>
         <p:nvGrpSpPr>
-          <p:cNvPr id="117" name="Group 116">
-            <a:extLst>
-              <a:ext uri="{FF2B5EF4-FFF2-40B4-BE49-F238E27FC236}">
-                <a16:creationId xmlns:a16="http://schemas.microsoft.com/office/drawing/2014/main" id="{15FAFB2F-ABC9-F04A-A6EB-B56E77F8DE4E}"/>
+          <p:cNvPr id="68" name="Group 67">
+            <a:extLst>
+              <a:ext uri="{FF2B5EF4-FFF2-40B4-BE49-F238E27FC236}">
+                <a16:creationId xmlns:a16="http://schemas.microsoft.com/office/drawing/2014/main" id="{544C3B4F-99B1-9640-873B-0CF26504ADEF}"/>
               </a:ext>
             </a:extLst>
           </p:cNvPr>
@@ -3727,18 +3732,18 @@
         </p:nvGrpSpPr>
         <p:grpSpPr>
           <a:xfrm>
-            <a:off x="2392875" y="1200147"/>
-            <a:ext cx="1309188" cy="591218"/>
+            <a:off x="1603746" y="1057866"/>
+            <a:ext cx="1571025" cy="690995"/>
             <a:chOff x="10550830" y="5180714"/>
-            <a:chExt cx="1571025" cy="709461"/>
+            <a:chExt cx="1571025" cy="690995"/>
           </a:xfrm>
         </p:grpSpPr>
         <p:sp>
           <p:nvSpPr>
-            <p:cNvPr id="118" name="TextBox 117">
+            <p:cNvPr id="69" name="TextBox 68">
               <a:extLst>
                 <a:ext uri="{FF2B5EF4-FFF2-40B4-BE49-F238E27FC236}">
-                  <a16:creationId xmlns:a16="http://schemas.microsoft.com/office/drawing/2014/main" id="{B80F46AE-D1F9-EA49-8A5E-9220571AB5DB}"/>
+                  <a16:creationId xmlns:a16="http://schemas.microsoft.com/office/drawing/2014/main" id="{12243044-C17E-CA4E-B7BB-1F927504A95F}"/>
                 </a:ext>
               </a:extLst>
             </p:cNvPr>
@@ -3748,7 +3753,7 @@
           <p:spPr>
             <a:xfrm>
               <a:off x="10550830" y="5594710"/>
-              <a:ext cx="1571025" cy="295465"/>
+              <a:ext cx="1571025" cy="276999"/>
             </a:xfrm>
             <a:prstGeom prst="rect">
               <a:avLst/>
@@ -3761,9 +3766,9 @@
             </a:bodyPr>
             <a:lstStyle/>
             <a:p>
-              <a:pPr algn="ctr" defTabSz="914307"/>
+              <a:pPr algn="ctr" defTabSz="1097212"/>
               <a:r>
-                <a:rPr lang="en-US" sz="1000" dirty="0">
+                <a:rPr lang="en-US" sz="1200" dirty="0">
                   <a:solidFill>
                     <a:srgbClr val="000000"/>
                   </a:solidFill>
@@ -3776,10 +3781,10 @@
         </p:sp>
         <p:pic>
           <p:nvPicPr>
-            <p:cNvPr id="119" name="Graphic 118">
+            <p:cNvPr id="70" name="Graphic 69">
               <a:extLst>
                 <a:ext uri="{FF2B5EF4-FFF2-40B4-BE49-F238E27FC236}">
-                  <a16:creationId xmlns:a16="http://schemas.microsoft.com/office/drawing/2014/main" id="{C82478E4-F926-FD45-BDAF-E99EA771ADE4}"/>
+                  <a16:creationId xmlns:a16="http://schemas.microsoft.com/office/drawing/2014/main" id="{3B504064-39A3-8F44-AE0F-FAE666167881}"/>
                 </a:ext>
               </a:extLst>
             </p:cNvPr>
@@ -3813,10 +3818,10 @@
       </p:grpSp>
       <p:grpSp>
         <p:nvGrpSpPr>
-          <p:cNvPr id="120" name="Group 119">
-            <a:extLst>
-              <a:ext uri="{FF2B5EF4-FFF2-40B4-BE49-F238E27FC236}">
-                <a16:creationId xmlns:a16="http://schemas.microsoft.com/office/drawing/2014/main" id="{76AEF004-248C-1D4E-A20E-7471FDCC5FE4}"/>
+          <p:cNvPr id="71" name="Group 70">
+            <a:extLst>
+              <a:ext uri="{FF2B5EF4-FFF2-40B4-BE49-F238E27FC236}">
+                <a16:creationId xmlns:a16="http://schemas.microsoft.com/office/drawing/2014/main" id="{3AC8837F-5D17-6D48-952C-083E9F908648}"/>
               </a:ext>
             </a:extLst>
           </p:cNvPr>
@@ -3825,18 +3830,18 @@
         </p:nvGrpSpPr>
         <p:grpSpPr>
           <a:xfrm>
-            <a:off x="2392875" y="2040702"/>
-            <a:ext cx="1309188" cy="616930"/>
+            <a:off x="1603746" y="2066533"/>
+            <a:ext cx="1571025" cy="721773"/>
             <a:chOff x="901503" y="3366618"/>
-            <a:chExt cx="1571025" cy="740316"/>
+            <a:chExt cx="1571025" cy="721773"/>
           </a:xfrm>
         </p:grpSpPr>
         <p:sp>
           <p:nvSpPr>
-            <p:cNvPr id="121" name="TextBox 120">
+            <p:cNvPr id="72" name="TextBox 71">
               <a:extLst>
                 <a:ext uri="{FF2B5EF4-FFF2-40B4-BE49-F238E27FC236}">
-                  <a16:creationId xmlns:a16="http://schemas.microsoft.com/office/drawing/2014/main" id="{B9D09FD7-CFC0-EE4A-89BF-A0049F2D5132}"/>
+                  <a16:creationId xmlns:a16="http://schemas.microsoft.com/office/drawing/2014/main" id="{8D7E13C1-BD23-3E46-9806-5DB06267E959}"/>
                 </a:ext>
               </a:extLst>
             </p:cNvPr>
@@ -3845,8 +3850,8 @@
           </p:nvSpPr>
           <p:spPr>
             <a:xfrm>
-              <a:off x="901503" y="3780613"/>
-              <a:ext cx="1571025" cy="326321"/>
+              <a:off x="901503" y="3780614"/>
+              <a:ext cx="1571025" cy="307777"/>
             </a:xfrm>
             <a:prstGeom prst="rect">
               <a:avLst/>
@@ -3859,9 +3864,9 @@
             </a:bodyPr>
             <a:lstStyle/>
             <a:p>
-              <a:pPr algn="ctr" defTabSz="914307"/>
+              <a:pPr algn="ctr" defTabSz="1097212"/>
               <a:r>
-                <a:rPr lang="en-US" sz="1167" dirty="0">
+                <a:rPr lang="en-US" sz="1400" dirty="0">
                   <a:solidFill>
                     <a:srgbClr val="000000"/>
                   </a:solidFill>
@@ -3874,10 +3879,10 @@
         </p:sp>
         <p:pic>
           <p:nvPicPr>
-            <p:cNvPr id="122" name="Graphic 121">
+            <p:cNvPr id="73" name="Graphic 72">
               <a:extLst>
                 <a:ext uri="{FF2B5EF4-FFF2-40B4-BE49-F238E27FC236}">
-                  <a16:creationId xmlns:a16="http://schemas.microsoft.com/office/drawing/2014/main" id="{07D90F32-B8BB-F842-B562-9D8D8EE4C94F}"/>
+                  <a16:creationId xmlns:a16="http://schemas.microsoft.com/office/drawing/2014/main" id="{44EFF84B-4B1B-3040-B6C6-130CC1AD07E6}"/>
                 </a:ext>
               </a:extLst>
             </p:cNvPr>
@@ -3911,10 +3916,10 @@
       </p:grpSp>
       <p:grpSp>
         <p:nvGrpSpPr>
-          <p:cNvPr id="123" name="Group 122">
-            <a:extLst>
-              <a:ext uri="{FF2B5EF4-FFF2-40B4-BE49-F238E27FC236}">
-                <a16:creationId xmlns:a16="http://schemas.microsoft.com/office/drawing/2014/main" id="{919C0796-FDB8-0E41-8930-34368988C9FD}"/>
+          <p:cNvPr id="74" name="Group 73">
+            <a:extLst>
+              <a:ext uri="{FF2B5EF4-FFF2-40B4-BE49-F238E27FC236}">
+                <a16:creationId xmlns:a16="http://schemas.microsoft.com/office/drawing/2014/main" id="{FB621BE9-F6AD-FB44-BE22-45865D07FB9C}"/>
               </a:ext>
             </a:extLst>
           </p:cNvPr>
@@ -3923,18 +3928,18 @@
         </p:nvGrpSpPr>
         <p:grpSpPr>
           <a:xfrm>
-            <a:off x="2217575" y="4915452"/>
-            <a:ext cx="1918253" cy="873520"/>
+            <a:off x="1393386" y="5516234"/>
+            <a:ext cx="2301904" cy="1029679"/>
             <a:chOff x="6646130" y="1136121"/>
-            <a:chExt cx="2301904" cy="1048223"/>
+            <a:chExt cx="2301904" cy="1029679"/>
           </a:xfrm>
         </p:grpSpPr>
         <p:sp>
           <p:nvSpPr>
-            <p:cNvPr id="124" name="TextBox 123">
+            <p:cNvPr id="75" name="TextBox 74">
               <a:extLst>
                 <a:ext uri="{FF2B5EF4-FFF2-40B4-BE49-F238E27FC236}">
-                  <a16:creationId xmlns:a16="http://schemas.microsoft.com/office/drawing/2014/main" id="{BA4BA838-B21B-124E-9B4E-076A2A877EC8}"/>
+                  <a16:creationId xmlns:a16="http://schemas.microsoft.com/office/drawing/2014/main" id="{546ED0E3-BE5A-6543-809A-D1C726951524}"/>
                 </a:ext>
               </a:extLst>
             </p:cNvPr>
@@ -3944,7 +3949,7 @@
           <p:spPr>
             <a:xfrm>
               <a:off x="6646130" y="1858023"/>
-              <a:ext cx="2301904" cy="326321"/>
+              <a:ext cx="2301904" cy="307777"/>
             </a:xfrm>
             <a:prstGeom prst="rect">
               <a:avLst/>
@@ -3957,9 +3962,9 @@
             </a:bodyPr>
             <a:lstStyle/>
             <a:p>
-              <a:pPr algn="ctr" defTabSz="914307"/>
+              <a:pPr algn="ctr" defTabSz="1097212"/>
               <a:r>
-                <a:rPr lang="en-US" sz="1167" dirty="0">
+                <a:rPr lang="en-US" sz="1400" dirty="0">
                   <a:solidFill>
                     <a:srgbClr val="000000"/>
                   </a:solidFill>
@@ -3972,10 +3977,10 @@
         </p:sp>
         <p:pic>
           <p:nvPicPr>
-            <p:cNvPr id="125" name="Graphic 124">
+            <p:cNvPr id="76" name="Graphic 75">
               <a:extLst>
                 <a:ext uri="{FF2B5EF4-FFF2-40B4-BE49-F238E27FC236}">
-                  <a16:creationId xmlns:a16="http://schemas.microsoft.com/office/drawing/2014/main" id="{A9605EBC-6E22-A947-969C-8EBA357026CE}"/>
+                  <a16:creationId xmlns:a16="http://schemas.microsoft.com/office/drawing/2014/main" id="{035FC959-0F52-6E47-8AAE-12D7DF1B9D63}"/>
                 </a:ext>
               </a:extLst>
             </p:cNvPr>
@@ -4007,42 +4012,12 @@
           </p:spPr>
         </p:pic>
       </p:grpSp>
-      <p:pic>
-        <p:nvPicPr>
-          <p:cNvPr id="126" name="Picture 125">
-            <a:extLst>
-              <a:ext uri="{FF2B5EF4-FFF2-40B4-BE49-F238E27FC236}">
-                <a16:creationId xmlns:a16="http://schemas.microsoft.com/office/drawing/2014/main" id="{0A1F280D-93B4-4D45-980E-BE10C6573109}"/>
-              </a:ext>
-            </a:extLst>
-          </p:cNvPr>
-          <p:cNvPicPr>
-            <a:picLocks noChangeAspect="1"/>
-          </p:cNvPicPr>
-          <p:nvPr/>
-        </p:nvPicPr>
-        <p:blipFill>
-          <a:blip r:embed="rId16"/>
-          <a:stretch>
-            <a:fillRect/>
-          </a:stretch>
-        </p:blipFill>
-        <p:spPr>
-          <a:xfrm>
-            <a:off x="9838414" y="2485725"/>
-            <a:ext cx="837758" cy="837758"/>
-          </a:xfrm>
-          <a:prstGeom prst="rect">
-            <a:avLst/>
-          </a:prstGeom>
-        </p:spPr>
-      </p:pic>
       <p:cxnSp>
         <p:nvCxnSpPr>
-          <p:cNvPr id="127" name="Straight Arrow Connector 126">
-            <a:extLst>
-              <a:ext uri="{FF2B5EF4-FFF2-40B4-BE49-F238E27FC236}">
-                <a16:creationId xmlns:a16="http://schemas.microsoft.com/office/drawing/2014/main" id="{B414FDB8-20A8-5149-9F96-55054B6FCC40}"/>
+          <p:cNvPr id="77" name="Straight Arrow Connector 76">
+            <a:extLst>
+              <a:ext uri="{FF2B5EF4-FFF2-40B4-BE49-F238E27FC236}">
+                <a16:creationId xmlns:a16="http://schemas.microsoft.com/office/drawing/2014/main" id="{D0ED23AD-239E-9B4E-BF5B-8E14F74E72BE}"/>
               </a:ext>
             </a:extLst>
           </p:cNvPr>
@@ -4053,8 +4028,8 @@
         </p:nvCxnSpPr>
         <p:spPr>
           <a:xfrm flipH="1">
-            <a:off x="3047469" y="1771542"/>
-            <a:ext cx="1" cy="239078"/>
+            <a:off x="2389258" y="1743543"/>
+            <a:ext cx="1" cy="286894"/>
           </a:xfrm>
           <a:prstGeom prst="straightConnector1">
             <a:avLst/>
@@ -4073,24 +4048,24 @@
       </p:cxnSp>
       <p:cxnSp>
         <p:nvCxnSpPr>
-          <p:cNvPr id="128" name="Elbow Connector 127">
-            <a:extLst>
-              <a:ext uri="{FF2B5EF4-FFF2-40B4-BE49-F238E27FC236}">
-                <a16:creationId xmlns:a16="http://schemas.microsoft.com/office/drawing/2014/main" id="{61B7448D-0725-9647-90AD-055D5BECB9E2}"/>
+          <p:cNvPr id="78" name="Elbow Connector 77">
+            <a:extLst>
+              <a:ext uri="{FF2B5EF4-FFF2-40B4-BE49-F238E27FC236}">
+                <a16:creationId xmlns:a16="http://schemas.microsoft.com/office/drawing/2014/main" id="{5A74EB80-EF34-B74C-9E87-0F5A9122408E}"/>
               </a:ext>
             </a:extLst>
           </p:cNvPr>
           <p:cNvCxnSpPr>
             <a:cxnSpLocks/>
-            <a:stCxn id="119" idx="1"/>
-            <a:endCxn id="107" idx="1"/>
+            <a:stCxn id="70" idx="1"/>
+            <a:endCxn id="58" idx="1"/>
           </p:cNvCxnSpPr>
           <p:nvPr/>
         </p:nvCxnSpPr>
         <p:spPr>
           <a:xfrm rot="10800000" flipH="1" flipV="1">
-            <a:off x="2851676" y="1395936"/>
-            <a:ext cx="2245756" cy="2749980"/>
+            <a:off x="2154307" y="1292816"/>
+            <a:ext cx="2694907" cy="3299976"/>
           </a:xfrm>
           <a:prstGeom prst="bentConnector3">
             <a:avLst>
@@ -4100,7 +4075,7 @@
           <a:noFill/>
           <a:ln w="19050" cap="flat" cmpd="sng" algn="ctr">
             <a:solidFill>
-              <a:srgbClr val="000000"/>
+              <a:srgbClr val="00B050"/>
             </a:solidFill>
             <a:prstDash val="solid"/>
             <a:tailEnd type="triangle"/>
@@ -4110,23 +4085,23 @@
       </p:cxnSp>
       <p:cxnSp>
         <p:nvCxnSpPr>
-          <p:cNvPr id="129" name="Elbow Connector 128">
-            <a:extLst>
-              <a:ext uri="{FF2B5EF4-FFF2-40B4-BE49-F238E27FC236}">
-                <a16:creationId xmlns:a16="http://schemas.microsoft.com/office/drawing/2014/main" id="{5D646891-899B-1F4D-940F-C6442B160CFC}"/>
+          <p:cNvPr id="79" name="Elbow Connector 78">
+            <a:extLst>
+              <a:ext uri="{FF2B5EF4-FFF2-40B4-BE49-F238E27FC236}">
+                <a16:creationId xmlns:a16="http://schemas.microsoft.com/office/drawing/2014/main" id="{A58CEA41-6784-FC42-AB46-5465B0AB03E1}"/>
               </a:ext>
             </a:extLst>
           </p:cNvPr>
           <p:cNvCxnSpPr>
             <a:cxnSpLocks/>
-            <a:endCxn id="125" idx="0"/>
+            <a:endCxn id="76" idx="0"/>
           </p:cNvCxnSpPr>
           <p:nvPr/>
         </p:nvCxnSpPr>
         <p:spPr>
           <a:xfrm rot="10800000" flipV="1">
-            <a:off x="3176702" y="4295121"/>
-            <a:ext cx="1887235" cy="620330"/>
+            <a:off x="2544338" y="4771838"/>
+            <a:ext cx="2264682" cy="744396"/>
           </a:xfrm>
           <a:prstGeom prst="bentConnector2">
             <a:avLst/>
@@ -4134,7 +4109,7 @@
           <a:noFill/>
           <a:ln w="19050" cap="flat" cmpd="sng" algn="ctr">
             <a:solidFill>
-              <a:srgbClr val="000000"/>
+              <a:srgbClr val="FF0000"/>
             </a:solidFill>
             <a:prstDash val="solid"/>
             <a:headEnd type="triangle" w="med" len="med"/>
@@ -4145,23 +4120,23 @@
       </p:cxnSp>
       <p:cxnSp>
         <p:nvCxnSpPr>
-          <p:cNvPr id="130" name="Elbow Connector 129">
-            <a:extLst>
-              <a:ext uri="{FF2B5EF4-FFF2-40B4-BE49-F238E27FC236}">
-                <a16:creationId xmlns:a16="http://schemas.microsoft.com/office/drawing/2014/main" id="{895F7664-041B-B049-8D6B-0A955BC7C441}"/>
+          <p:cNvPr id="80" name="Elbow Connector 79">
+            <a:extLst>
+              <a:ext uri="{FF2B5EF4-FFF2-40B4-BE49-F238E27FC236}">
+                <a16:creationId xmlns:a16="http://schemas.microsoft.com/office/drawing/2014/main" id="{45D38E86-B5A6-444B-8DC3-D310982B7CCE}"/>
               </a:ext>
             </a:extLst>
           </p:cNvPr>
           <p:cNvCxnSpPr>
             <a:cxnSpLocks/>
-            <a:endCxn id="111" idx="1"/>
+            <a:endCxn id="62" idx="1"/>
           </p:cNvCxnSpPr>
           <p:nvPr/>
         </p:nvCxnSpPr>
         <p:spPr>
           <a:xfrm>
-            <a:off x="5690099" y="4295121"/>
-            <a:ext cx="2525686" cy="213913"/>
+            <a:off x="5560414" y="4771838"/>
+            <a:ext cx="3030823" cy="256695"/>
           </a:xfrm>
           <a:prstGeom prst="bentConnector3">
             <a:avLst>
@@ -4171,7 +4146,7 @@
           <a:noFill/>
           <a:ln w="19050" cap="flat" cmpd="sng" algn="ctr">
             <a:solidFill>
-              <a:srgbClr val="000000"/>
+              <a:srgbClr val="00B050"/>
             </a:solidFill>
             <a:prstDash val="solid"/>
             <a:headEnd type="none" w="med" len="med"/>
@@ -4182,24 +4157,24 @@
       </p:cxnSp>
       <p:cxnSp>
         <p:nvCxnSpPr>
-          <p:cNvPr id="131" name="Elbow Connector 130">
-            <a:extLst>
-              <a:ext uri="{FF2B5EF4-FFF2-40B4-BE49-F238E27FC236}">
-                <a16:creationId xmlns:a16="http://schemas.microsoft.com/office/drawing/2014/main" id="{A1FBBA09-6B2F-1346-BF0B-EBD5684770CC}"/>
+          <p:cNvPr id="81" name="Elbow Connector 80">
+            <a:extLst>
+              <a:ext uri="{FF2B5EF4-FFF2-40B4-BE49-F238E27FC236}">
+                <a16:creationId xmlns:a16="http://schemas.microsoft.com/office/drawing/2014/main" id="{F5D9D30C-1421-0D4C-B09C-6E20C93DDE0C}"/>
               </a:ext>
             </a:extLst>
           </p:cNvPr>
           <p:cNvCxnSpPr>
             <a:cxnSpLocks/>
-            <a:stCxn id="107" idx="3"/>
-            <a:endCxn id="126" idx="1"/>
+            <a:stCxn id="58" idx="3"/>
+            <a:endCxn id="100" idx="1"/>
           </p:cNvCxnSpPr>
           <p:nvPr/>
         </p:nvCxnSpPr>
         <p:spPr>
           <a:xfrm flipV="1">
-            <a:off x="5690099" y="2904604"/>
-            <a:ext cx="4148315" cy="1241312"/>
+            <a:off x="5560415" y="3103218"/>
+            <a:ext cx="4977978" cy="1489574"/>
           </a:xfrm>
           <a:prstGeom prst="bentConnector3">
             <a:avLst>
@@ -4220,24 +4195,24 @@
       </p:cxnSp>
       <p:cxnSp>
         <p:nvCxnSpPr>
-          <p:cNvPr id="132" name="Straight Arrow Connector 131">
-            <a:extLst>
-              <a:ext uri="{FF2B5EF4-FFF2-40B4-BE49-F238E27FC236}">
-                <a16:creationId xmlns:a16="http://schemas.microsoft.com/office/drawing/2014/main" id="{73FDE51F-7AD1-5E4F-85D1-4F833AD8041A}"/>
+          <p:cNvPr id="82" name="Straight Arrow Connector 81">
+            <a:extLst>
+              <a:ext uri="{FF2B5EF4-FFF2-40B4-BE49-F238E27FC236}">
+                <a16:creationId xmlns:a16="http://schemas.microsoft.com/office/drawing/2014/main" id="{7BD03042-DDE7-C84C-86F3-5648E1963D05}"/>
               </a:ext>
             </a:extLst>
           </p:cNvPr>
           <p:cNvCxnSpPr>
             <a:cxnSpLocks/>
-            <a:stCxn id="116" idx="1"/>
-            <a:endCxn id="119" idx="3"/>
+            <a:stCxn id="67" idx="1"/>
+            <a:endCxn id="70" idx="3"/>
           </p:cNvCxnSpPr>
           <p:nvPr/>
         </p:nvCxnSpPr>
         <p:spPr>
           <a:xfrm flipH="1">
-            <a:off x="3243260" y="1394839"/>
-            <a:ext cx="596235" cy="1097"/>
+            <a:off x="2624208" y="1291500"/>
+            <a:ext cx="715482" cy="1316"/>
           </a:xfrm>
           <a:prstGeom prst="straightConnector1">
             <a:avLst/>
@@ -4245,7 +4220,7 @@
           <a:noFill/>
           <a:ln w="19050" cap="flat" cmpd="sng" algn="ctr">
             <a:solidFill>
-              <a:srgbClr val="000000"/>
+              <a:srgbClr val="00B050"/>
             </a:solidFill>
             <a:prstDash val="solid"/>
             <a:tailEnd type="triangle"/>
@@ -4255,10 +4230,10 @@
       </p:cxnSp>
       <p:grpSp>
         <p:nvGrpSpPr>
-          <p:cNvPr id="133" name="Group 132">
-            <a:extLst>
-              <a:ext uri="{FF2B5EF4-FFF2-40B4-BE49-F238E27FC236}">
-                <a16:creationId xmlns:a16="http://schemas.microsoft.com/office/drawing/2014/main" id="{DD0FB668-8809-4C4F-83F8-AA1236CC22C4}"/>
+          <p:cNvPr id="83" name="Group 82">
+            <a:extLst>
+              <a:ext uri="{FF2B5EF4-FFF2-40B4-BE49-F238E27FC236}">
+                <a16:creationId xmlns:a16="http://schemas.microsoft.com/office/drawing/2014/main" id="{241210D3-2745-E94F-9742-83C48E7B9BB6}"/>
               </a:ext>
             </a:extLst>
           </p:cNvPr>
@@ -4267,18 +4242,18 @@
         </p:nvGrpSpPr>
         <p:grpSpPr>
           <a:xfrm>
-            <a:off x="4605135" y="1200147"/>
-            <a:ext cx="1398713" cy="591218"/>
+            <a:off x="4258458" y="1057866"/>
+            <a:ext cx="1678456" cy="690995"/>
             <a:chOff x="10550830" y="5180714"/>
-            <a:chExt cx="1678456" cy="709461"/>
+            <a:chExt cx="1678456" cy="690995"/>
           </a:xfrm>
         </p:grpSpPr>
         <p:sp>
           <p:nvSpPr>
-            <p:cNvPr id="134" name="TextBox 133">
+            <p:cNvPr id="84" name="TextBox 83">
               <a:extLst>
                 <a:ext uri="{FF2B5EF4-FFF2-40B4-BE49-F238E27FC236}">
-                  <a16:creationId xmlns:a16="http://schemas.microsoft.com/office/drawing/2014/main" id="{FEC4B7E0-B381-3C4D-AF13-564E2539A8A1}"/>
+                  <a16:creationId xmlns:a16="http://schemas.microsoft.com/office/drawing/2014/main" id="{6D613D77-9728-E54B-BDDB-83F8B1A92FC0}"/>
                 </a:ext>
               </a:extLst>
             </p:cNvPr>
@@ -4288,7 +4263,7 @@
           <p:spPr>
             <a:xfrm>
               <a:off x="10550830" y="5594710"/>
-              <a:ext cx="1678456" cy="295465"/>
+              <a:ext cx="1678456" cy="276999"/>
             </a:xfrm>
             <a:prstGeom prst="rect">
               <a:avLst/>
@@ -4301,9 +4276,9 @@
             </a:bodyPr>
             <a:lstStyle/>
             <a:p>
-              <a:pPr algn="ctr" defTabSz="914307"/>
+              <a:pPr algn="ctr" defTabSz="1097212"/>
               <a:r>
-                <a:rPr lang="en-US" sz="1000" dirty="0">
+                <a:rPr lang="en-US" sz="1200" dirty="0">
                   <a:solidFill>
                     <a:srgbClr val="000000"/>
                   </a:solidFill>
@@ -4316,10 +4291,10 @@
         </p:sp>
         <p:pic>
           <p:nvPicPr>
-            <p:cNvPr id="135" name="Graphic 134">
+            <p:cNvPr id="85" name="Graphic 84">
               <a:extLst>
                 <a:ext uri="{FF2B5EF4-FFF2-40B4-BE49-F238E27FC236}">
-                  <a16:creationId xmlns:a16="http://schemas.microsoft.com/office/drawing/2014/main" id="{83101A86-A043-6A40-92E1-FC9F0297C1CA}"/>
+                  <a16:creationId xmlns:a16="http://schemas.microsoft.com/office/drawing/2014/main" id="{E740419E-2B9D-1B4B-A733-B9855EFF0B29}"/>
                 </a:ext>
               </a:extLst>
             </p:cNvPr>
@@ -4353,10 +4328,10 @@
       </p:grpSp>
       <p:grpSp>
         <p:nvGrpSpPr>
-          <p:cNvPr id="136" name="Group 135">
-            <a:extLst>
-              <a:ext uri="{FF2B5EF4-FFF2-40B4-BE49-F238E27FC236}">
-                <a16:creationId xmlns:a16="http://schemas.microsoft.com/office/drawing/2014/main" id="{8A5B7557-A8B4-764C-B359-838D53DDD096}"/>
+          <p:cNvPr id="86" name="Group 85">
+            <a:extLst>
+              <a:ext uri="{FF2B5EF4-FFF2-40B4-BE49-F238E27FC236}">
+                <a16:creationId xmlns:a16="http://schemas.microsoft.com/office/drawing/2014/main" id="{D397119A-7278-6D42-A932-5BEBE0D33392}"/>
               </a:ext>
             </a:extLst>
           </p:cNvPr>
@@ -4365,18 +4340,18 @@
         </p:nvGrpSpPr>
         <p:grpSpPr>
           <a:xfrm>
-            <a:off x="4625189" y="2040702"/>
-            <a:ext cx="1309188" cy="616930"/>
+            <a:off x="4282522" y="2066533"/>
+            <a:ext cx="1571025" cy="721773"/>
             <a:chOff x="901503" y="3366618"/>
-            <a:chExt cx="1571025" cy="740316"/>
+            <a:chExt cx="1571025" cy="721773"/>
           </a:xfrm>
         </p:grpSpPr>
         <p:sp>
           <p:nvSpPr>
-            <p:cNvPr id="137" name="TextBox 136">
+            <p:cNvPr id="87" name="TextBox 86">
               <a:extLst>
                 <a:ext uri="{FF2B5EF4-FFF2-40B4-BE49-F238E27FC236}">
-                  <a16:creationId xmlns:a16="http://schemas.microsoft.com/office/drawing/2014/main" id="{DD24AFF6-2F4C-9F44-91C9-5EE9D8BC2801}"/>
+                  <a16:creationId xmlns:a16="http://schemas.microsoft.com/office/drawing/2014/main" id="{66EF7EF1-F68D-1C40-AB50-82A9DCBC78DB}"/>
                 </a:ext>
               </a:extLst>
             </p:cNvPr>
@@ -4385,8 +4360,8 @@
           </p:nvSpPr>
           <p:spPr>
             <a:xfrm>
-              <a:off x="901503" y="3780613"/>
-              <a:ext cx="1571025" cy="326321"/>
+              <a:off x="901503" y="3780614"/>
+              <a:ext cx="1571025" cy="307777"/>
             </a:xfrm>
             <a:prstGeom prst="rect">
               <a:avLst/>
@@ -4399,9 +4374,9 @@
             </a:bodyPr>
             <a:lstStyle/>
             <a:p>
-              <a:pPr algn="ctr" defTabSz="914307"/>
+              <a:pPr algn="ctr" defTabSz="1097212"/>
               <a:r>
-                <a:rPr lang="en-US" sz="1167" dirty="0">
+                <a:rPr lang="en-US" sz="1400" dirty="0">
                   <a:solidFill>
                     <a:srgbClr val="000000"/>
                   </a:solidFill>
@@ -4414,10 +4389,10 @@
         </p:sp>
         <p:pic>
           <p:nvPicPr>
-            <p:cNvPr id="138" name="Graphic 137">
+            <p:cNvPr id="88" name="Graphic 87">
               <a:extLst>
                 <a:ext uri="{FF2B5EF4-FFF2-40B4-BE49-F238E27FC236}">
-                  <a16:creationId xmlns:a16="http://schemas.microsoft.com/office/drawing/2014/main" id="{65E36178-67B6-F44A-906C-C8BBF8360806}"/>
+                  <a16:creationId xmlns:a16="http://schemas.microsoft.com/office/drawing/2014/main" id="{040C7B9D-0063-AA41-BB7B-00AEB69D472D}"/>
                 </a:ext>
               </a:extLst>
             </p:cNvPr>
@@ -4451,10 +4426,10 @@
       </p:grpSp>
       <p:cxnSp>
         <p:nvCxnSpPr>
-          <p:cNvPr id="139" name="Straight Arrow Connector 138">
-            <a:extLst>
-              <a:ext uri="{FF2B5EF4-FFF2-40B4-BE49-F238E27FC236}">
-                <a16:creationId xmlns:a16="http://schemas.microsoft.com/office/drawing/2014/main" id="{8E388D43-6482-F946-BE45-D8BADC21CC14}"/>
+          <p:cNvPr id="89" name="Straight Arrow Connector 88">
+            <a:extLst>
+              <a:ext uri="{FF2B5EF4-FFF2-40B4-BE49-F238E27FC236}">
+                <a16:creationId xmlns:a16="http://schemas.microsoft.com/office/drawing/2014/main" id="{F5F126D5-EF61-F949-8B1A-65315C73366D}"/>
               </a:ext>
             </a:extLst>
           </p:cNvPr>
@@ -4465,8 +4440,8 @@
         </p:nvCxnSpPr>
         <p:spPr>
           <a:xfrm>
-            <a:off x="4501199" y="1434692"/>
-            <a:ext cx="506143" cy="8223"/>
+            <a:off x="4133734" y="1339323"/>
+            <a:ext cx="607371" cy="9868"/>
           </a:xfrm>
           <a:prstGeom prst="straightConnector1">
             <a:avLst/>
@@ -4474,7 +4449,7 @@
           <a:noFill/>
           <a:ln w="19050" cap="flat" cmpd="sng" algn="ctr">
             <a:solidFill>
-              <a:srgbClr val="000000"/>
+              <a:srgbClr val="FF0000"/>
             </a:solidFill>
             <a:prstDash val="solid"/>
             <a:tailEnd type="triangle"/>
@@ -4484,10 +4459,10 @@
       </p:cxnSp>
       <p:cxnSp>
         <p:nvCxnSpPr>
-          <p:cNvPr id="140" name="Straight Arrow Connector 139">
-            <a:extLst>
-              <a:ext uri="{FF2B5EF4-FFF2-40B4-BE49-F238E27FC236}">
-                <a16:creationId xmlns:a16="http://schemas.microsoft.com/office/drawing/2014/main" id="{38E5DF4B-D8BF-434E-9190-80D26B90AE23}"/>
+          <p:cNvPr id="90" name="Straight Arrow Connector 89">
+            <a:extLst>
+              <a:ext uri="{FF2B5EF4-FFF2-40B4-BE49-F238E27FC236}">
+                <a16:creationId xmlns:a16="http://schemas.microsoft.com/office/drawing/2014/main" id="{E4B7DB8A-33DB-144C-B7CC-4C763D540E7D}"/>
               </a:ext>
             </a:extLst>
           </p:cNvPr>
@@ -4498,8 +4473,8 @@
         </p:nvCxnSpPr>
         <p:spPr>
           <a:xfrm flipH="1">
-            <a:off x="5279782" y="1766367"/>
-            <a:ext cx="1" cy="239078"/>
+            <a:off x="5068034" y="1737333"/>
+            <a:ext cx="1" cy="286894"/>
           </a:xfrm>
           <a:prstGeom prst="straightConnector1">
             <a:avLst/>
@@ -4518,24 +4493,24 @@
       </p:cxnSp>
       <p:cxnSp>
         <p:nvCxnSpPr>
-          <p:cNvPr id="141" name="Elbow Connector 140">
-            <a:extLst>
-              <a:ext uri="{FF2B5EF4-FFF2-40B4-BE49-F238E27FC236}">
-                <a16:creationId xmlns:a16="http://schemas.microsoft.com/office/drawing/2014/main" id="{D278566D-1D7D-D244-82CB-0AB5928B4379}"/>
+          <p:cNvPr id="91" name="Elbow Connector 90">
+            <a:extLst>
+              <a:ext uri="{FF2B5EF4-FFF2-40B4-BE49-F238E27FC236}">
+                <a16:creationId xmlns:a16="http://schemas.microsoft.com/office/drawing/2014/main" id="{42357E56-FC34-D041-853E-0603C758EA3F}"/>
               </a:ext>
             </a:extLst>
           </p:cNvPr>
           <p:cNvCxnSpPr>
             <a:cxnSpLocks/>
-            <a:stCxn id="135" idx="3"/>
-            <a:endCxn id="107" idx="0"/>
+            <a:stCxn id="85" idx="3"/>
+            <a:endCxn id="58" idx="0"/>
           </p:cNvCxnSpPr>
           <p:nvPr/>
         </p:nvCxnSpPr>
         <p:spPr>
           <a:xfrm flipH="1">
-            <a:off x="5393766" y="1395936"/>
-            <a:ext cx="61754" cy="2453647"/>
+            <a:off x="5204815" y="1292816"/>
+            <a:ext cx="74105" cy="2944376"/>
           </a:xfrm>
           <a:prstGeom prst="bentConnector4">
             <a:avLst>
@@ -4546,7 +4521,7 @@
           <a:noFill/>
           <a:ln w="19050" cap="flat" cmpd="sng" algn="ctr">
             <a:solidFill>
-              <a:srgbClr val="000000"/>
+              <a:srgbClr val="FF0000"/>
             </a:solidFill>
             <a:prstDash val="solid"/>
             <a:tailEnd type="triangle"/>
@@ -4556,10 +4531,10 @@
       </p:cxnSp>
       <p:grpSp>
         <p:nvGrpSpPr>
-          <p:cNvPr id="142" name="Group 141">
-            <a:extLst>
-              <a:ext uri="{FF2B5EF4-FFF2-40B4-BE49-F238E27FC236}">
-                <a16:creationId xmlns:a16="http://schemas.microsoft.com/office/drawing/2014/main" id="{40A5A235-E240-E64D-B171-326CF3B7A0DB}"/>
+          <p:cNvPr id="92" name="Group 91">
+            <a:extLst>
+              <a:ext uri="{FF2B5EF4-FFF2-40B4-BE49-F238E27FC236}">
+                <a16:creationId xmlns:a16="http://schemas.microsoft.com/office/drawing/2014/main" id="{8A4ED0EE-A615-9247-9A6D-FF02DE41A3EF}"/>
               </a:ext>
             </a:extLst>
           </p:cNvPr>
@@ -4568,18 +4543,18 @@
         </p:nvGrpSpPr>
         <p:grpSpPr>
           <a:xfrm>
-            <a:off x="6152063" y="733410"/>
-            <a:ext cx="1918253" cy="961668"/>
+            <a:off x="6114771" y="497785"/>
+            <a:ext cx="2301904" cy="1154001"/>
             <a:chOff x="5586656" y="283164"/>
             <a:chExt cx="2301904" cy="1154001"/>
           </a:xfrm>
         </p:grpSpPr>
         <p:sp>
           <p:nvSpPr>
-            <p:cNvPr id="143" name="TextBox 142">
+            <p:cNvPr id="93" name="TextBox 92">
               <a:extLst>
                 <a:ext uri="{FF2B5EF4-FFF2-40B4-BE49-F238E27FC236}">
-                  <a16:creationId xmlns:a16="http://schemas.microsoft.com/office/drawing/2014/main" id="{8FF94EE9-DCD3-8541-80B1-45DCFFE7800A}"/>
+                  <a16:creationId xmlns:a16="http://schemas.microsoft.com/office/drawing/2014/main" id="{EF76BB5B-0589-A946-A3B7-1CB732FB2ABE}"/>
                 </a:ext>
               </a:extLst>
             </p:cNvPr>
@@ -4589,7 +4564,7 @@
           <p:spPr>
             <a:xfrm>
               <a:off x="5586656" y="283164"/>
-              <a:ext cx="2301904" cy="326321"/>
+              <a:ext cx="2301904" cy="307777"/>
             </a:xfrm>
             <a:prstGeom prst="rect">
               <a:avLst/>
@@ -4602,9 +4577,9 @@
             </a:bodyPr>
             <a:lstStyle/>
             <a:p>
-              <a:pPr algn="ctr" defTabSz="914307"/>
+              <a:pPr algn="ctr" defTabSz="1097212"/>
               <a:r>
-                <a:rPr lang="en-US" sz="1167" dirty="0">
+                <a:rPr lang="en-US" sz="1400" dirty="0">
                   <a:solidFill>
                     <a:srgbClr val="000000"/>
                   </a:solidFill>
@@ -4617,10 +4592,10 @@
         </p:sp>
         <p:pic>
           <p:nvPicPr>
-            <p:cNvPr id="144" name="Graphic 143">
+            <p:cNvPr id="94" name="Graphic 93">
               <a:extLst>
                 <a:ext uri="{FF2B5EF4-FFF2-40B4-BE49-F238E27FC236}">
-                  <a16:creationId xmlns:a16="http://schemas.microsoft.com/office/drawing/2014/main" id="{BA0FAD25-44F6-E147-B6D7-238B6A24C237}"/>
+                  <a16:creationId xmlns:a16="http://schemas.microsoft.com/office/drawing/2014/main" id="{C44921E8-EA9D-4E43-AA09-ABDC33B20F02}"/>
                 </a:ext>
               </a:extLst>
             </p:cNvPr>
@@ -4630,10 +4605,10 @@
             <p:nvPr/>
           </p:nvPicPr>
           <p:blipFill>
-            <a:blip r:embed="rId17">
+            <a:blip r:embed="rId16">
               <a:extLst>
                 <a:ext uri="{96DAC541-7B7A-43D3-8B79-37D633B846F1}">
-                  <asvg:svgBlip xmlns:asvg="http://schemas.microsoft.com/office/drawing/2016/SVG/main" r:embed="rId18"/>
+                  <asvg:svgBlip xmlns:asvg="http://schemas.microsoft.com/office/drawing/2016/SVG/main" r:embed="rId17"/>
                 </a:ext>
               </a:extLst>
             </a:blip>
@@ -4652,161 +4627,233 @@
           </p:spPr>
         </p:pic>
       </p:grpSp>
-      <p:cxnSp>
-        <p:nvCxnSpPr>
-          <p:cNvPr id="145" name="Straight Connector 144">
-            <a:extLst>
-              <a:ext uri="{FF2B5EF4-FFF2-40B4-BE49-F238E27FC236}">
-                <a16:creationId xmlns:a16="http://schemas.microsoft.com/office/drawing/2014/main" id="{7D3D9FD5-62CC-FB43-8ADB-FB5FD6F18130}"/>
-              </a:ext>
-            </a:extLst>
-          </p:cNvPr>
-          <p:cNvCxnSpPr>
-            <a:cxnSpLocks/>
-          </p:cNvCxnSpPr>
+      <p:grpSp>
+        <p:nvGrpSpPr>
+          <p:cNvPr id="95" name="Group 94">
+            <a:extLst>
+              <a:ext uri="{FF2B5EF4-FFF2-40B4-BE49-F238E27FC236}">
+                <a16:creationId xmlns:a16="http://schemas.microsoft.com/office/drawing/2014/main" id="{7D06ED4C-0ACF-E74A-B395-C4A182A75AD9}"/>
+              </a:ext>
+            </a:extLst>
+          </p:cNvPr>
+          <p:cNvGrpSpPr/>
           <p:nvPr/>
-        </p:nvCxnSpPr>
+        </p:nvGrpSpPr>
+        <p:grpSpPr>
+          <a:xfrm>
+            <a:off x="5560414" y="1260950"/>
+            <a:ext cx="1349709" cy="3145445"/>
+            <a:chOff x="7678510" y="2164465"/>
+            <a:chExt cx="1349709" cy="3145445"/>
+          </a:xfrm>
+        </p:grpSpPr>
+        <p:cxnSp>
+          <p:nvCxnSpPr>
+            <p:cNvPr id="96" name="Straight Connector 95">
+              <a:extLst>
+                <a:ext uri="{FF2B5EF4-FFF2-40B4-BE49-F238E27FC236}">
+                  <a16:creationId xmlns:a16="http://schemas.microsoft.com/office/drawing/2014/main" id="{A92D788B-6FEF-3F48-99B5-FFB8666A3F13}"/>
+                </a:ext>
+              </a:extLst>
+            </p:cNvPr>
+            <p:cNvCxnSpPr>
+              <a:cxnSpLocks/>
+            </p:cNvCxnSpPr>
+            <p:nvPr/>
+          </p:nvCxnSpPr>
+          <p:spPr>
+            <a:xfrm>
+              <a:off x="8404405" y="2164465"/>
+              <a:ext cx="623814" cy="0"/>
+            </a:xfrm>
+            <a:prstGeom prst="line">
+              <a:avLst/>
+            </a:prstGeom>
+            <a:noFill/>
+            <a:ln w="19050" cap="flat" cmpd="sng" algn="ctr">
+              <a:solidFill>
+                <a:srgbClr val="FF0000"/>
+              </a:solidFill>
+              <a:prstDash val="solid"/>
+              <a:headEnd type="none" w="med" len="med"/>
+              <a:tailEnd type="triangle" w="med" len="med"/>
+            </a:ln>
+            <a:effectLst/>
+          </p:spPr>
+        </p:cxnSp>
+        <p:cxnSp>
+          <p:nvCxnSpPr>
+            <p:cNvPr id="97" name="Straight Connector 96">
+              <a:extLst>
+                <a:ext uri="{FF2B5EF4-FFF2-40B4-BE49-F238E27FC236}">
+                  <a16:creationId xmlns:a16="http://schemas.microsoft.com/office/drawing/2014/main" id="{C2C39B9E-C0D2-3547-9C51-C8941C1359A1}"/>
+                </a:ext>
+              </a:extLst>
+            </p:cNvPr>
+            <p:cNvCxnSpPr>
+              <a:cxnSpLocks/>
+            </p:cNvCxnSpPr>
+            <p:nvPr/>
+          </p:nvCxnSpPr>
+          <p:spPr>
+            <a:xfrm>
+              <a:off x="7678510" y="5301884"/>
+              <a:ext cx="725895" cy="0"/>
+            </a:xfrm>
+            <a:prstGeom prst="line">
+              <a:avLst/>
+            </a:prstGeom>
+            <a:noFill/>
+            <a:ln w="19050" cap="flat" cmpd="sng" algn="ctr">
+              <a:solidFill>
+                <a:srgbClr val="FF0000"/>
+              </a:solidFill>
+              <a:prstDash val="solid"/>
+            </a:ln>
+            <a:effectLst/>
+          </p:spPr>
+        </p:cxnSp>
+        <p:cxnSp>
+          <p:nvCxnSpPr>
+            <p:cNvPr id="98" name="Straight Connector 97">
+              <a:extLst>
+                <a:ext uri="{FF2B5EF4-FFF2-40B4-BE49-F238E27FC236}">
+                  <a16:creationId xmlns:a16="http://schemas.microsoft.com/office/drawing/2014/main" id="{17D26AA1-029B-6340-86D0-49D9421C26E8}"/>
+                </a:ext>
+              </a:extLst>
+            </p:cNvPr>
+            <p:cNvCxnSpPr>
+              <a:cxnSpLocks/>
+            </p:cNvCxnSpPr>
+            <p:nvPr/>
+          </p:nvCxnSpPr>
+          <p:spPr>
+            <a:xfrm flipH="1" flipV="1">
+              <a:off x="8404405" y="2164465"/>
+              <a:ext cx="1" cy="3145445"/>
+            </a:xfrm>
+            <a:prstGeom prst="line">
+              <a:avLst/>
+            </a:prstGeom>
+            <a:noFill/>
+            <a:ln w="19050" cap="flat" cmpd="sng" algn="ctr">
+              <a:solidFill>
+                <a:srgbClr val="FF0000"/>
+              </a:solidFill>
+              <a:prstDash val="solid"/>
+            </a:ln>
+            <a:effectLst/>
+          </p:spPr>
+        </p:cxnSp>
+      </p:grpSp>
+      <p:grpSp>
+        <p:nvGrpSpPr>
+          <p:cNvPr id="99" name="Group 98">
+            <a:extLst>
+              <a:ext uri="{FF2B5EF4-FFF2-40B4-BE49-F238E27FC236}">
+                <a16:creationId xmlns:a16="http://schemas.microsoft.com/office/drawing/2014/main" id="{82D64066-753A-0C42-9109-9B6BCA807C63}"/>
+              </a:ext>
+            </a:extLst>
+          </p:cNvPr>
+          <p:cNvGrpSpPr/>
+          <p:nvPr/>
+        </p:nvGrpSpPr>
+        <p:grpSpPr>
+          <a:xfrm>
+            <a:off x="9890096" y="2301483"/>
+            <a:ext cx="2301904" cy="1304390"/>
+            <a:chOff x="12008192" y="3204998"/>
+            <a:chExt cx="2301904" cy="1304390"/>
+          </a:xfrm>
+        </p:grpSpPr>
+        <p:pic>
+          <p:nvPicPr>
+            <p:cNvPr id="100" name="Picture 99">
+              <a:extLst>
+                <a:ext uri="{FF2B5EF4-FFF2-40B4-BE49-F238E27FC236}">
+                  <a16:creationId xmlns:a16="http://schemas.microsoft.com/office/drawing/2014/main" id="{2C399423-A977-E448-926F-3BF7AD2CE49C}"/>
+                </a:ext>
+              </a:extLst>
+            </p:cNvPr>
+            <p:cNvPicPr>
+              <a:picLocks noChangeAspect="1"/>
+            </p:cNvPicPr>
+            <p:nvPr/>
+          </p:nvPicPr>
+          <p:blipFill>
+            <a:blip r:embed="rId18"/>
+            <a:stretch>
+              <a:fillRect/>
+            </a:stretch>
+          </p:blipFill>
+          <p:spPr>
+            <a:xfrm>
+              <a:off x="12656489" y="3504078"/>
+              <a:ext cx="1005310" cy="1005310"/>
+            </a:xfrm>
+            <a:prstGeom prst="rect">
+              <a:avLst/>
+            </a:prstGeom>
+          </p:spPr>
+        </p:pic>
+        <p:sp>
+          <p:nvSpPr>
+            <p:cNvPr id="101" name="TextBox 100">
+              <a:extLst>
+                <a:ext uri="{FF2B5EF4-FFF2-40B4-BE49-F238E27FC236}">
+                  <a16:creationId xmlns:a16="http://schemas.microsoft.com/office/drawing/2014/main" id="{72352BFC-8E40-8C40-923D-5A91C7F82A0D}"/>
+                </a:ext>
+              </a:extLst>
+            </p:cNvPr>
+            <p:cNvSpPr txBox="1"/>
+            <p:nvPr/>
+          </p:nvSpPr>
+          <p:spPr>
+            <a:xfrm>
+              <a:off x="12008192" y="3204998"/>
+              <a:ext cx="2301904" cy="307777"/>
+            </a:xfrm>
+            <a:prstGeom prst="rect">
+              <a:avLst/>
+            </a:prstGeom>
+            <a:noFill/>
+          </p:spPr>
+          <p:txBody>
+            <a:bodyPr wrap="square" rtlCol="0">
+              <a:spAutoFit/>
+            </a:bodyPr>
+            <a:lstStyle/>
+            <a:p>
+              <a:pPr algn="ctr" defTabSz="1097212"/>
+              <a:r>
+                <a:rPr lang="en-US" sz="1400" dirty="0">
+                  <a:solidFill>
+                    <a:srgbClr val="000000"/>
+                  </a:solidFill>
+                  <a:latin typeface="Amazon Ember"/>
+                </a:rPr>
+                <a:t>Twitter API services</a:t>
+              </a:r>
+            </a:p>
+          </p:txBody>
+        </p:sp>
+      </p:grpSp>
+      <p:sp>
+        <p:nvSpPr>
+          <p:cNvPr id="102" name="Oval 101">
+            <a:extLst>
+              <a:ext uri="{FF2B5EF4-FFF2-40B4-BE49-F238E27FC236}">
+                <a16:creationId xmlns:a16="http://schemas.microsoft.com/office/drawing/2014/main" id="{2D5C65F1-E711-6142-B83C-65DFEE8F1744}"/>
+              </a:ext>
+            </a:extLst>
+          </p:cNvPr>
+          <p:cNvSpPr/>
+          <p:nvPr/>
+        </p:nvSpPr>
         <p:spPr>
           <a:xfrm>
-            <a:off x="6295011" y="1369381"/>
-            <a:ext cx="519845" cy="0"/>
-          </a:xfrm>
-          <a:prstGeom prst="line">
-            <a:avLst/>
-          </a:prstGeom>
-          <a:noFill/>
-          <a:ln w="19050" cap="flat" cmpd="sng" algn="ctr">
-            <a:solidFill>
-              <a:srgbClr val="000000"/>
-            </a:solidFill>
-            <a:prstDash val="solid"/>
-            <a:headEnd type="none" w="med" len="med"/>
-            <a:tailEnd type="triangle" w="med" len="med"/>
-          </a:ln>
-          <a:effectLst/>
-        </p:spPr>
-      </p:cxnSp>
-      <p:cxnSp>
-        <p:nvCxnSpPr>
-          <p:cNvPr id="146" name="Straight Connector 145">
-            <a:extLst>
-              <a:ext uri="{FF2B5EF4-FFF2-40B4-BE49-F238E27FC236}">
-                <a16:creationId xmlns:a16="http://schemas.microsoft.com/office/drawing/2014/main" id="{AAA52AFD-B6C4-DE4A-8A77-CDF9F45CCFEB}"/>
-              </a:ext>
-            </a:extLst>
-          </p:cNvPr>
-          <p:cNvCxnSpPr>
-            <a:cxnSpLocks/>
-          </p:cNvCxnSpPr>
-          <p:nvPr/>
-        </p:nvCxnSpPr>
-        <p:spPr>
-          <a:xfrm>
-            <a:off x="5690099" y="3983897"/>
-            <a:ext cx="604913" cy="0"/>
-          </a:xfrm>
-          <a:prstGeom prst="line">
-            <a:avLst/>
-          </a:prstGeom>
-          <a:noFill/>
-          <a:ln w="19050" cap="flat" cmpd="sng" algn="ctr">
-            <a:solidFill>
-              <a:srgbClr val="000000"/>
-            </a:solidFill>
-            <a:prstDash val="solid"/>
-          </a:ln>
-          <a:effectLst/>
-        </p:spPr>
-      </p:cxnSp>
-      <p:cxnSp>
-        <p:nvCxnSpPr>
-          <p:cNvPr id="147" name="Straight Connector 146">
-            <a:extLst>
-              <a:ext uri="{FF2B5EF4-FFF2-40B4-BE49-F238E27FC236}">
-                <a16:creationId xmlns:a16="http://schemas.microsoft.com/office/drawing/2014/main" id="{586D955C-F19D-E547-8606-8B47F7B355B5}"/>
-              </a:ext>
-            </a:extLst>
-          </p:cNvPr>
-          <p:cNvCxnSpPr>
-            <a:cxnSpLocks/>
-          </p:cNvCxnSpPr>
-          <p:nvPr/>
-        </p:nvCxnSpPr>
-        <p:spPr>
-          <a:xfrm flipH="1" flipV="1">
-            <a:off x="6295011" y="1369381"/>
-            <a:ext cx="1" cy="2621204"/>
-          </a:xfrm>
-          <a:prstGeom prst="line">
-            <a:avLst/>
-          </a:prstGeom>
-          <a:noFill/>
-          <a:ln w="19050" cap="flat" cmpd="sng" algn="ctr">
-            <a:solidFill>
-              <a:srgbClr val="000000"/>
-            </a:solidFill>
-            <a:prstDash val="solid"/>
-          </a:ln>
-          <a:effectLst/>
-        </p:spPr>
-      </p:cxnSp>
-      <p:sp>
-        <p:nvSpPr>
-          <p:cNvPr id="148" name="TextBox 147">
-            <a:extLst>
-              <a:ext uri="{FF2B5EF4-FFF2-40B4-BE49-F238E27FC236}">
-                <a16:creationId xmlns:a16="http://schemas.microsoft.com/office/drawing/2014/main" id="{89E020E4-210A-B245-ABB6-1C1D5A89A858}"/>
-              </a:ext>
-            </a:extLst>
-          </p:cNvPr>
-          <p:cNvSpPr txBox="1"/>
-          <p:nvPr/>
-        </p:nvSpPr>
-        <p:spPr>
-          <a:xfrm>
-            <a:off x="9298167" y="2236492"/>
-            <a:ext cx="1918253" cy="271934"/>
-          </a:xfrm>
-          <a:prstGeom prst="rect">
-            <a:avLst/>
-          </a:prstGeom>
-          <a:noFill/>
-        </p:spPr>
-        <p:txBody>
-          <a:bodyPr wrap="square" rtlCol="0">
-            <a:spAutoFit/>
-          </a:bodyPr>
-          <a:lstStyle/>
-          <a:p>
-            <a:pPr algn="ctr" defTabSz="914307"/>
-            <a:r>
-              <a:rPr lang="en-US" sz="1167" dirty="0">
-                <a:solidFill>
-                  <a:srgbClr val="000000"/>
-                </a:solidFill>
-                <a:latin typeface="Amazon Ember"/>
-              </a:rPr>
-              <a:t>Twitter API services</a:t>
-            </a:r>
-          </a:p>
-        </p:txBody>
-      </p:sp>
-      <p:sp>
-        <p:nvSpPr>
-          <p:cNvPr id="149" name="Oval 148">
-            <a:extLst>
-              <a:ext uri="{FF2B5EF4-FFF2-40B4-BE49-F238E27FC236}">
-                <a16:creationId xmlns:a16="http://schemas.microsoft.com/office/drawing/2014/main" id="{E3F4FD56-C10A-124F-ADCA-9515E74B6C24}"/>
-              </a:ext>
-            </a:extLst>
-          </p:cNvPr>
-          <p:cNvSpPr/>
-          <p:nvPr/>
-        </p:nvSpPr>
-        <p:spPr>
-          <a:xfrm>
-            <a:off x="4883508" y="3247999"/>
-            <a:ext cx="400964" cy="330743"/>
+            <a:off x="4592505" y="3515291"/>
+            <a:ext cx="481157" cy="396891"/>
           </a:xfrm>
           <a:prstGeom prst="ellipse">
             <a:avLst/>
@@ -4828,7 +4875,7 @@
           <a:bodyPr rtlCol="0" anchor="ctr"/>
           <a:lstStyle/>
           <a:p>
-            <a:pPr marL="0" marR="0" lvl="0" indent="0" algn="ctr" defTabSz="914307" eaLnBrk="1" fontAlgn="auto" latinLnBrk="0" hangingPunct="1">
+            <a:pPr marL="0" marR="0" lvl="0" indent="0" algn="ctr" defTabSz="1097212" eaLnBrk="1" fontAlgn="auto" latinLnBrk="0" hangingPunct="1">
               <a:lnSpc>
                 <a:spcPct val="100000"/>
               </a:lnSpc>
@@ -4846,7 +4893,7 @@
               <a:defRPr/>
             </a:pPr>
             <a:r>
-              <a:rPr kumimoji="0" lang="en-US" sz="1765" b="0" i="0" u="none" strike="noStrike" kern="0" cap="none" spc="0" normalizeH="0" baseline="0" noProof="0" dirty="0">
+              <a:rPr kumimoji="0" lang="en-US" sz="2118" b="0" i="0" u="none" strike="noStrike" kern="0" cap="none" spc="0" normalizeH="0" baseline="0" noProof="0" dirty="0">
                 <a:ln>
                   <a:noFill/>
                 </a:ln>
@@ -4867,10 +4914,10 @@
       </p:sp>
       <p:sp>
         <p:nvSpPr>
-          <p:cNvPr id="150" name="Oval 149">
-            <a:extLst>
-              <a:ext uri="{FF2B5EF4-FFF2-40B4-BE49-F238E27FC236}">
-                <a16:creationId xmlns:a16="http://schemas.microsoft.com/office/drawing/2014/main" id="{A54D3598-BD51-4940-903F-5E9A7B5B746C}"/>
+          <p:cNvPr id="103" name="Oval 102">
+            <a:extLst>
+              <a:ext uri="{FF2B5EF4-FFF2-40B4-BE49-F238E27FC236}">
+                <a16:creationId xmlns:a16="http://schemas.microsoft.com/office/drawing/2014/main" id="{7E7A5A57-79E5-594F-A0B6-7E3840656619}"/>
               </a:ext>
             </a:extLst>
           </p:cNvPr>
@@ -4879,8 +4926,8 @@
         </p:nvSpPr>
         <p:spPr>
           <a:xfrm>
-            <a:off x="2333421" y="3226253"/>
-            <a:ext cx="400964" cy="330743"/>
+            <a:off x="1532401" y="3489196"/>
+            <a:ext cx="481157" cy="396891"/>
           </a:xfrm>
           <a:prstGeom prst="ellipse">
             <a:avLst/>
@@ -4902,7 +4949,7 @@
           <a:bodyPr rtlCol="0" anchor="ctr"/>
           <a:lstStyle/>
           <a:p>
-            <a:pPr marL="0" marR="0" lvl="0" indent="0" algn="ctr" defTabSz="914307" eaLnBrk="1" fontAlgn="auto" latinLnBrk="0" hangingPunct="1">
+            <a:pPr marL="0" marR="0" lvl="0" indent="0" algn="ctr" defTabSz="1097212" eaLnBrk="1" fontAlgn="auto" latinLnBrk="0" hangingPunct="1">
               <a:lnSpc>
                 <a:spcPct val="100000"/>
               </a:lnSpc>
@@ -4920,7 +4967,7 @@
               <a:defRPr/>
             </a:pPr>
             <a:r>
-              <a:rPr kumimoji="0" lang="en-US" sz="1765" b="0" i="0" u="none" strike="noStrike" kern="0" cap="none" spc="0" normalizeH="0" baseline="0" noProof="0" dirty="0">
+              <a:rPr kumimoji="0" lang="en-US" sz="2118" b="0" i="0" u="none" strike="noStrike" kern="0" cap="none" spc="0" normalizeH="0" baseline="0" noProof="0" dirty="0">
                 <a:ln>
                   <a:noFill/>
                 </a:ln>
@@ -4941,10 +4988,10 @@
       </p:sp>
       <p:sp>
         <p:nvSpPr>
-          <p:cNvPr id="151" name="Oval 150">
-            <a:extLst>
-              <a:ext uri="{FF2B5EF4-FFF2-40B4-BE49-F238E27FC236}">
-                <a16:creationId xmlns:a16="http://schemas.microsoft.com/office/drawing/2014/main" id="{04CFC234-4ED2-C140-9B48-C018F5EE4038}"/>
+          <p:cNvPr id="104" name="Oval 103">
+            <a:extLst>
+              <a:ext uri="{FF2B5EF4-FFF2-40B4-BE49-F238E27FC236}">
+                <a16:creationId xmlns:a16="http://schemas.microsoft.com/office/drawing/2014/main" id="{1D9B4E8C-21BF-0446-9221-54E10779EE21}"/>
               </a:ext>
             </a:extLst>
           </p:cNvPr>
@@ -4953,8 +5000,8 @@
         </p:nvSpPr>
         <p:spPr>
           <a:xfrm>
-            <a:off x="3242531" y="4416759"/>
-            <a:ext cx="400964" cy="330743"/>
+            <a:off x="2623332" y="4917804"/>
+            <a:ext cx="481157" cy="396891"/>
           </a:xfrm>
           <a:prstGeom prst="ellipse">
             <a:avLst/>
@@ -4976,7 +5023,7 @@
           <a:bodyPr rtlCol="0" anchor="ctr"/>
           <a:lstStyle/>
           <a:p>
-            <a:pPr marL="0" marR="0" lvl="0" indent="0" algn="ctr" defTabSz="914307" eaLnBrk="1" fontAlgn="auto" latinLnBrk="0" hangingPunct="1">
+            <a:pPr marL="0" marR="0" lvl="0" indent="0" algn="ctr" defTabSz="1097212" eaLnBrk="1" fontAlgn="auto" latinLnBrk="0" hangingPunct="1">
               <a:lnSpc>
                 <a:spcPct val="100000"/>
               </a:lnSpc>
@@ -4994,7 +5041,7 @@
               <a:defRPr/>
             </a:pPr>
             <a:r>
-              <a:rPr kumimoji="0" lang="en-US" sz="1765" b="0" i="0" u="none" strike="noStrike" kern="0" cap="none" spc="0" normalizeH="0" baseline="0" noProof="0" dirty="0">
+              <a:rPr kumimoji="0" lang="en-US" sz="2118" b="0" i="0" u="none" strike="noStrike" kern="0" cap="none" spc="0" normalizeH="0" baseline="0" noProof="0" dirty="0">
                 <a:ln>
                   <a:noFill/>
                 </a:ln>
@@ -5015,10 +5062,10 @@
       </p:sp>
       <p:sp>
         <p:nvSpPr>
-          <p:cNvPr id="152" name="Oval 151">
-            <a:extLst>
-              <a:ext uri="{FF2B5EF4-FFF2-40B4-BE49-F238E27FC236}">
-                <a16:creationId xmlns:a16="http://schemas.microsoft.com/office/drawing/2014/main" id="{121365F0-A153-C64A-988B-BDD729D112E9}"/>
+          <p:cNvPr id="105" name="Oval 104">
+            <a:extLst>
+              <a:ext uri="{FF2B5EF4-FFF2-40B4-BE49-F238E27FC236}">
+                <a16:creationId xmlns:a16="http://schemas.microsoft.com/office/drawing/2014/main" id="{A5380244-569B-124C-A66D-875B2B8BAEC1}"/>
               </a:ext>
             </a:extLst>
           </p:cNvPr>
@@ -5027,8 +5074,8 @@
         </p:nvSpPr>
         <p:spPr>
           <a:xfrm>
-            <a:off x="8798441" y="2992741"/>
-            <a:ext cx="400964" cy="330743"/>
+            <a:off x="9290424" y="3208982"/>
+            <a:ext cx="481157" cy="396891"/>
           </a:xfrm>
           <a:prstGeom prst="ellipse">
             <a:avLst/>
@@ -5050,7 +5097,7 @@
           <a:bodyPr rtlCol="0" anchor="ctr"/>
           <a:lstStyle/>
           <a:p>
-            <a:pPr marL="0" marR="0" lvl="0" indent="0" algn="ctr" defTabSz="914307" eaLnBrk="1" fontAlgn="auto" latinLnBrk="0" hangingPunct="1">
+            <a:pPr marL="0" marR="0" lvl="0" indent="0" algn="ctr" defTabSz="1097212" eaLnBrk="1" fontAlgn="auto" latinLnBrk="0" hangingPunct="1">
               <a:lnSpc>
                 <a:spcPct val="100000"/>
               </a:lnSpc>
@@ -5068,7 +5115,7 @@
               <a:defRPr/>
             </a:pPr>
             <a:r>
-              <a:rPr kumimoji="0" lang="en-US" sz="1765" b="0" i="0" u="none" strike="noStrike" kern="0" cap="none" spc="0" normalizeH="0" baseline="0" noProof="0" dirty="0">
+              <a:rPr kumimoji="0" lang="en-US" sz="2118" b="0" i="0" u="none" strike="noStrike" kern="0" cap="none" spc="0" normalizeH="0" baseline="0" noProof="0" dirty="0">
                 <a:ln>
                   <a:noFill/>
                 </a:ln>
@@ -5089,10 +5136,10 @@
       </p:sp>
       <p:sp>
         <p:nvSpPr>
-          <p:cNvPr id="153" name="Oval 152">
-            <a:extLst>
-              <a:ext uri="{FF2B5EF4-FFF2-40B4-BE49-F238E27FC236}">
-                <a16:creationId xmlns:a16="http://schemas.microsoft.com/office/drawing/2014/main" id="{10E26FD6-A56D-D44E-AB29-F10ECBACEAA4}"/>
+          <p:cNvPr id="106" name="Oval 105">
+            <a:extLst>
+              <a:ext uri="{FF2B5EF4-FFF2-40B4-BE49-F238E27FC236}">
+                <a16:creationId xmlns:a16="http://schemas.microsoft.com/office/drawing/2014/main" id="{AE932085-19EF-A24A-A4FC-870968EF74A5}"/>
               </a:ext>
             </a:extLst>
           </p:cNvPr>
@@ -5101,8 +5148,8 @@
         </p:nvSpPr>
         <p:spPr>
           <a:xfrm>
-            <a:off x="7407523" y="4575099"/>
-            <a:ext cx="400964" cy="330743"/>
+            <a:off x="7621323" y="5107812"/>
+            <a:ext cx="481157" cy="396891"/>
           </a:xfrm>
           <a:prstGeom prst="ellipse">
             <a:avLst/>
@@ -5124,7 +5171,7 @@
           <a:bodyPr rtlCol="0" anchor="ctr"/>
           <a:lstStyle/>
           <a:p>
-            <a:pPr marL="0" marR="0" lvl="0" indent="0" algn="ctr" defTabSz="914307" eaLnBrk="1" fontAlgn="auto" latinLnBrk="0" hangingPunct="1">
+            <a:pPr marL="0" marR="0" lvl="0" indent="0" algn="ctr" defTabSz="1097212" eaLnBrk="1" fontAlgn="auto" latinLnBrk="0" hangingPunct="1">
               <a:lnSpc>
                 <a:spcPct val="100000"/>
               </a:lnSpc>
@@ -5142,7 +5189,7 @@
               <a:defRPr/>
             </a:pPr>
             <a:r>
-              <a:rPr kumimoji="0" lang="en-US" sz="1765" b="0" i="0" u="none" strike="noStrike" kern="0" cap="none" spc="0" normalizeH="0" baseline="0" noProof="0" dirty="0">
+              <a:rPr kumimoji="0" lang="en-US" sz="2118" b="0" i="0" u="none" strike="noStrike" kern="0" cap="none" spc="0" normalizeH="0" baseline="0" noProof="0" dirty="0">
                 <a:ln>
                   <a:noFill/>
                 </a:ln>
@@ -5163,10 +5210,10 @@
       </p:sp>
       <p:sp>
         <p:nvSpPr>
-          <p:cNvPr id="154" name="Oval 153">
-            <a:extLst>
-              <a:ext uri="{FF2B5EF4-FFF2-40B4-BE49-F238E27FC236}">
-                <a16:creationId xmlns:a16="http://schemas.microsoft.com/office/drawing/2014/main" id="{9F03C7D7-EDFE-9249-BB98-DF0356ACAE47}"/>
+          <p:cNvPr id="107" name="Oval 106">
+            <a:extLst>
+              <a:ext uri="{FF2B5EF4-FFF2-40B4-BE49-F238E27FC236}">
+                <a16:creationId xmlns:a16="http://schemas.microsoft.com/office/drawing/2014/main" id="{D52F4EB9-A276-2B4C-9116-8756671B3DCA}"/>
               </a:ext>
             </a:extLst>
           </p:cNvPr>
@@ -5175,8 +5222,8 @@
         </p:nvSpPr>
         <p:spPr>
           <a:xfrm>
-            <a:off x="6370066" y="1902454"/>
-            <a:ext cx="400964" cy="330743"/>
+            <a:off x="6376375" y="1900637"/>
+            <a:ext cx="481157" cy="396891"/>
           </a:xfrm>
           <a:prstGeom prst="ellipse">
             <a:avLst/>
@@ -5198,7 +5245,7 @@
           <a:bodyPr rtlCol="0" anchor="ctr"/>
           <a:lstStyle/>
           <a:p>
-            <a:pPr marL="0" marR="0" lvl="0" indent="0" algn="ctr" defTabSz="914307" eaLnBrk="1" fontAlgn="auto" latinLnBrk="0" hangingPunct="1">
+            <a:pPr marL="0" marR="0" lvl="0" indent="0" algn="ctr" defTabSz="1097212" eaLnBrk="1" fontAlgn="auto" latinLnBrk="0" hangingPunct="1">
               <a:lnSpc>
                 <a:spcPct val="100000"/>
               </a:lnSpc>
@@ -5216,7 +5263,7 @@
               <a:defRPr/>
             </a:pPr>
             <a:r>
-              <a:rPr kumimoji="0" lang="en-US" sz="1765" b="0" i="0" u="none" strike="noStrike" kern="0" cap="none" spc="0" normalizeH="0" baseline="0" noProof="0" dirty="0">
+              <a:rPr kumimoji="0" lang="en-US" sz="2118" b="0" i="0" u="none" strike="noStrike" kern="0" cap="none" spc="0" normalizeH="0" baseline="0" noProof="0" dirty="0">
                 <a:ln>
                   <a:noFill/>
                 </a:ln>
@@ -5238,13 +5285,834 @@
     </p:spTree>
     <p:extLst>
       <p:ext uri="{BB962C8B-B14F-4D97-AF65-F5344CB8AC3E}">
-        <p14:creationId xmlns:p14="http://schemas.microsoft.com/office/powerpoint/2010/main" val="739175502"/>
+        <p14:creationId xmlns:p14="http://schemas.microsoft.com/office/powerpoint/2010/main" val="103138973"/>
       </p:ext>
     </p:extLst>
   </p:cSld>
   <p:clrMapOvr>
     <a:masterClrMapping/>
   </p:clrMapOvr>
+  <p:timing>
+    <p:tnLst>
+      <p:par>
+        <p:cTn id="1" dur="indefinite" restart="never" nodeType="tmRoot">
+          <p:childTnLst>
+            <p:seq concurrent="1" nextAc="seek">
+              <p:cTn id="2" dur="indefinite" nodeType="mainSeq">
+                <p:childTnLst>
+                  <p:par>
+                    <p:cTn id="3" fill="hold">
+                      <p:stCondLst>
+                        <p:cond delay="indefinite"/>
+                      </p:stCondLst>
+                      <p:childTnLst>
+                        <p:par>
+                          <p:cTn id="4" fill="hold">
+                            <p:stCondLst>
+                              <p:cond delay="0"/>
+                            </p:stCondLst>
+                            <p:childTnLst>
+                              <p:par>
+                                <p:cTn id="5" presetID="1" presetClass="entr" presetSubtype="0" fill="hold" nodeType="clickEffect">
+                                  <p:stCondLst>
+                                    <p:cond delay="0"/>
+                                  </p:stCondLst>
+                                  <p:childTnLst>
+                                    <p:set>
+                                      <p:cBhvr>
+                                        <p:cTn id="6" dur="1" fill="hold">
+                                          <p:stCondLst>
+                                            <p:cond delay="0"/>
+                                          </p:stCondLst>
+                                        </p:cTn>
+                                        <p:tgtEl>
+                                          <p:spTgt spid="90"/>
+                                        </p:tgtEl>
+                                        <p:attrNameLst>
+                                          <p:attrName>style.visibility</p:attrName>
+                                        </p:attrNameLst>
+                                      </p:cBhvr>
+                                      <p:to>
+                                        <p:strVal val="visible"/>
+                                      </p:to>
+                                    </p:set>
+                                  </p:childTnLst>
+                                </p:cTn>
+                              </p:par>
+                              <p:par>
+                                <p:cTn id="7" presetID="1" presetClass="entr" presetSubtype="0" fill="hold" nodeType="withEffect">
+                                  <p:stCondLst>
+                                    <p:cond delay="0"/>
+                                  </p:stCondLst>
+                                  <p:childTnLst>
+                                    <p:set>
+                                      <p:cBhvr>
+                                        <p:cTn id="8" dur="1" fill="hold">
+                                          <p:stCondLst>
+                                            <p:cond delay="0"/>
+                                          </p:stCondLst>
+                                        </p:cTn>
+                                        <p:tgtEl>
+                                          <p:spTgt spid="86"/>
+                                        </p:tgtEl>
+                                        <p:attrNameLst>
+                                          <p:attrName>style.visibility</p:attrName>
+                                        </p:attrNameLst>
+                                      </p:cBhvr>
+                                      <p:to>
+                                        <p:strVal val="visible"/>
+                                      </p:to>
+                                    </p:set>
+                                  </p:childTnLst>
+                                </p:cTn>
+                              </p:par>
+                              <p:par>
+                                <p:cTn id="9" presetID="1" presetClass="entr" presetSubtype="0" fill="hold" nodeType="withEffect">
+                                  <p:stCondLst>
+                                    <p:cond delay="0"/>
+                                  </p:stCondLst>
+                                  <p:childTnLst>
+                                    <p:set>
+                                      <p:cBhvr>
+                                        <p:cTn id="10" dur="1" fill="hold">
+                                          <p:stCondLst>
+                                            <p:cond delay="0"/>
+                                          </p:stCondLst>
+                                        </p:cTn>
+                                        <p:tgtEl>
+                                          <p:spTgt spid="83"/>
+                                        </p:tgtEl>
+                                        <p:attrNameLst>
+                                          <p:attrName>style.visibility</p:attrName>
+                                        </p:attrNameLst>
+                                      </p:cBhvr>
+                                      <p:to>
+                                        <p:strVal val="visible"/>
+                                      </p:to>
+                                    </p:set>
+                                  </p:childTnLst>
+                                </p:cTn>
+                              </p:par>
+                              <p:par>
+                                <p:cTn id="11" presetID="1" presetClass="entr" presetSubtype="0" fill="hold" nodeType="withEffect">
+                                  <p:stCondLst>
+                                    <p:cond delay="0"/>
+                                  </p:stCondLst>
+                                  <p:childTnLst>
+                                    <p:set>
+                                      <p:cBhvr>
+                                        <p:cTn id="12" dur="1" fill="hold">
+                                          <p:stCondLst>
+                                            <p:cond delay="0"/>
+                                          </p:stCondLst>
+                                        </p:cTn>
+                                        <p:tgtEl>
+                                          <p:spTgt spid="91"/>
+                                        </p:tgtEl>
+                                        <p:attrNameLst>
+                                          <p:attrName>style.visibility</p:attrName>
+                                        </p:attrNameLst>
+                                      </p:cBhvr>
+                                      <p:to>
+                                        <p:strVal val="visible"/>
+                                      </p:to>
+                                    </p:set>
+                                  </p:childTnLst>
+                                </p:cTn>
+                              </p:par>
+                              <p:par>
+                                <p:cTn id="13" presetID="1" presetClass="entr" presetSubtype="0" fill="hold" grpId="0" nodeType="withEffect">
+                                  <p:stCondLst>
+                                    <p:cond delay="0"/>
+                                  </p:stCondLst>
+                                  <p:childTnLst>
+                                    <p:set>
+                                      <p:cBhvr>
+                                        <p:cTn id="14" dur="1" fill="hold">
+                                          <p:stCondLst>
+                                            <p:cond delay="0"/>
+                                          </p:stCondLst>
+                                        </p:cTn>
+                                        <p:tgtEl>
+                                          <p:spTgt spid="102"/>
+                                        </p:tgtEl>
+                                        <p:attrNameLst>
+                                          <p:attrName>style.visibility</p:attrName>
+                                        </p:attrNameLst>
+                                      </p:cBhvr>
+                                      <p:to>
+                                        <p:strVal val="visible"/>
+                                      </p:to>
+                                    </p:set>
+                                  </p:childTnLst>
+                                </p:cTn>
+                              </p:par>
+                              <p:par>
+                                <p:cTn id="15" presetID="1" presetClass="entr" presetSubtype="0" fill="hold" nodeType="withEffect">
+                                  <p:stCondLst>
+                                    <p:cond delay="0"/>
+                                  </p:stCondLst>
+                                  <p:childTnLst>
+                                    <p:set>
+                                      <p:cBhvr>
+                                        <p:cTn id="16" dur="1" fill="hold">
+                                          <p:stCondLst>
+                                            <p:cond delay="0"/>
+                                          </p:stCondLst>
+                                        </p:cTn>
+                                        <p:tgtEl>
+                                          <p:spTgt spid="65"/>
+                                        </p:tgtEl>
+                                        <p:attrNameLst>
+                                          <p:attrName>style.visibility</p:attrName>
+                                        </p:attrNameLst>
+                                      </p:cBhvr>
+                                      <p:to>
+                                        <p:strVal val="visible"/>
+                                      </p:to>
+                                    </p:set>
+                                  </p:childTnLst>
+                                </p:cTn>
+                              </p:par>
+                              <p:par>
+                                <p:cTn id="17" presetID="1" presetClass="entr" presetSubtype="0" fill="hold" nodeType="withEffect">
+                                  <p:stCondLst>
+                                    <p:cond delay="0"/>
+                                  </p:stCondLst>
+                                  <p:childTnLst>
+                                    <p:set>
+                                      <p:cBhvr>
+                                        <p:cTn id="18" dur="1" fill="hold">
+                                          <p:stCondLst>
+                                            <p:cond delay="0"/>
+                                          </p:stCondLst>
+                                        </p:cTn>
+                                        <p:tgtEl>
+                                          <p:spTgt spid="89"/>
+                                        </p:tgtEl>
+                                        <p:attrNameLst>
+                                          <p:attrName>style.visibility</p:attrName>
+                                        </p:attrNameLst>
+                                      </p:cBhvr>
+                                      <p:to>
+                                        <p:strVal val="visible"/>
+                                      </p:to>
+                                    </p:set>
+                                  </p:childTnLst>
+                                </p:cTn>
+                              </p:par>
+                            </p:childTnLst>
+                          </p:cTn>
+                        </p:par>
+                      </p:childTnLst>
+                    </p:cTn>
+                  </p:par>
+                  <p:par>
+                    <p:cTn id="19" fill="hold">
+                      <p:stCondLst>
+                        <p:cond delay="indefinite"/>
+                      </p:stCondLst>
+                      <p:childTnLst>
+                        <p:par>
+                          <p:cTn id="20" fill="hold">
+                            <p:stCondLst>
+                              <p:cond delay="0"/>
+                            </p:stCondLst>
+                            <p:childTnLst>
+                              <p:par>
+                                <p:cTn id="21" presetID="1" presetClass="entr" presetSubtype="0" fill="hold" nodeType="clickEffect">
+                                  <p:stCondLst>
+                                    <p:cond delay="0"/>
+                                  </p:stCondLst>
+                                  <p:childTnLst>
+                                    <p:set>
+                                      <p:cBhvr>
+                                        <p:cTn id="22" dur="1" fill="hold">
+                                          <p:stCondLst>
+                                            <p:cond delay="0"/>
+                                          </p:stCondLst>
+                                        </p:cTn>
+                                        <p:tgtEl>
+                                          <p:spTgt spid="71"/>
+                                        </p:tgtEl>
+                                        <p:attrNameLst>
+                                          <p:attrName>style.visibility</p:attrName>
+                                        </p:attrNameLst>
+                                      </p:cBhvr>
+                                      <p:to>
+                                        <p:strVal val="visible"/>
+                                      </p:to>
+                                    </p:set>
+                                  </p:childTnLst>
+                                </p:cTn>
+                              </p:par>
+                              <p:par>
+                                <p:cTn id="23" presetID="1" presetClass="entr" presetSubtype="0" fill="hold" nodeType="withEffect">
+                                  <p:stCondLst>
+                                    <p:cond delay="0"/>
+                                  </p:stCondLst>
+                                  <p:childTnLst>
+                                    <p:set>
+                                      <p:cBhvr>
+                                        <p:cTn id="24" dur="1" fill="hold">
+                                          <p:stCondLst>
+                                            <p:cond delay="0"/>
+                                          </p:stCondLst>
+                                        </p:cTn>
+                                        <p:tgtEl>
+                                          <p:spTgt spid="68"/>
+                                        </p:tgtEl>
+                                        <p:attrNameLst>
+                                          <p:attrName>style.visibility</p:attrName>
+                                        </p:attrNameLst>
+                                      </p:cBhvr>
+                                      <p:to>
+                                        <p:strVal val="visible"/>
+                                      </p:to>
+                                    </p:set>
+                                  </p:childTnLst>
+                                </p:cTn>
+                              </p:par>
+                              <p:par>
+                                <p:cTn id="25" presetID="1" presetClass="entr" presetSubtype="0" fill="hold" nodeType="withEffect">
+                                  <p:stCondLst>
+                                    <p:cond delay="0"/>
+                                  </p:stCondLst>
+                                  <p:childTnLst>
+                                    <p:set>
+                                      <p:cBhvr>
+                                        <p:cTn id="26" dur="1" fill="hold">
+                                          <p:stCondLst>
+                                            <p:cond delay="0"/>
+                                          </p:stCondLst>
+                                        </p:cTn>
+                                        <p:tgtEl>
+                                          <p:spTgt spid="82"/>
+                                        </p:tgtEl>
+                                        <p:attrNameLst>
+                                          <p:attrName>style.visibility</p:attrName>
+                                        </p:attrNameLst>
+                                      </p:cBhvr>
+                                      <p:to>
+                                        <p:strVal val="visible"/>
+                                      </p:to>
+                                    </p:set>
+                                  </p:childTnLst>
+                                </p:cTn>
+                              </p:par>
+                              <p:par>
+                                <p:cTn id="27" presetID="1" presetClass="entr" presetSubtype="0" fill="hold" nodeType="withEffect">
+                                  <p:stCondLst>
+                                    <p:cond delay="0"/>
+                                  </p:stCondLst>
+                                  <p:childTnLst>
+                                    <p:set>
+                                      <p:cBhvr>
+                                        <p:cTn id="28" dur="1" fill="hold">
+                                          <p:stCondLst>
+                                            <p:cond delay="0"/>
+                                          </p:stCondLst>
+                                        </p:cTn>
+                                        <p:tgtEl>
+                                          <p:spTgt spid="78"/>
+                                        </p:tgtEl>
+                                        <p:attrNameLst>
+                                          <p:attrName>style.visibility</p:attrName>
+                                        </p:attrNameLst>
+                                      </p:cBhvr>
+                                      <p:to>
+                                        <p:strVal val="visible"/>
+                                      </p:to>
+                                    </p:set>
+                                  </p:childTnLst>
+                                </p:cTn>
+                              </p:par>
+                              <p:par>
+                                <p:cTn id="29" presetID="1" presetClass="entr" presetSubtype="0" fill="hold" grpId="0" nodeType="withEffect">
+                                  <p:stCondLst>
+                                    <p:cond delay="0"/>
+                                  </p:stCondLst>
+                                  <p:childTnLst>
+                                    <p:set>
+                                      <p:cBhvr>
+                                        <p:cTn id="30" dur="1" fill="hold">
+                                          <p:stCondLst>
+                                            <p:cond delay="0"/>
+                                          </p:stCondLst>
+                                        </p:cTn>
+                                        <p:tgtEl>
+                                          <p:spTgt spid="103"/>
+                                        </p:tgtEl>
+                                        <p:attrNameLst>
+                                          <p:attrName>style.visibility</p:attrName>
+                                        </p:attrNameLst>
+                                      </p:cBhvr>
+                                      <p:to>
+                                        <p:strVal val="visible"/>
+                                      </p:to>
+                                    </p:set>
+                                  </p:childTnLst>
+                                </p:cTn>
+                              </p:par>
+                              <p:par>
+                                <p:cTn id="31" presetID="1" presetClass="entr" presetSubtype="0" fill="hold" nodeType="withEffect">
+                                  <p:stCondLst>
+                                    <p:cond delay="0"/>
+                                  </p:stCondLst>
+                                  <p:childTnLst>
+                                    <p:set>
+                                      <p:cBhvr>
+                                        <p:cTn id="32" dur="1" fill="hold">
+                                          <p:stCondLst>
+                                            <p:cond delay="0"/>
+                                          </p:stCondLst>
+                                        </p:cTn>
+                                        <p:tgtEl>
+                                          <p:spTgt spid="77"/>
+                                        </p:tgtEl>
+                                        <p:attrNameLst>
+                                          <p:attrName>style.visibility</p:attrName>
+                                        </p:attrNameLst>
+                                      </p:cBhvr>
+                                      <p:to>
+                                        <p:strVal val="visible"/>
+                                      </p:to>
+                                    </p:set>
+                                  </p:childTnLst>
+                                </p:cTn>
+                              </p:par>
+                            </p:childTnLst>
+                          </p:cTn>
+                        </p:par>
+                      </p:childTnLst>
+                    </p:cTn>
+                  </p:par>
+                  <p:par>
+                    <p:cTn id="33" fill="hold">
+                      <p:stCondLst>
+                        <p:cond delay="indefinite"/>
+                      </p:stCondLst>
+                      <p:childTnLst>
+                        <p:par>
+                          <p:cTn id="34" fill="hold">
+                            <p:stCondLst>
+                              <p:cond delay="0"/>
+                            </p:stCondLst>
+                            <p:childTnLst>
+                              <p:par>
+                                <p:cTn id="35" presetID="1" presetClass="entr" presetSubtype="0" fill="hold" grpId="0" nodeType="clickEffect">
+                                  <p:stCondLst>
+                                    <p:cond delay="0"/>
+                                  </p:stCondLst>
+                                  <p:childTnLst>
+                                    <p:set>
+                                      <p:cBhvr>
+                                        <p:cTn id="36" dur="1" fill="hold">
+                                          <p:stCondLst>
+                                            <p:cond delay="0"/>
+                                          </p:stCondLst>
+                                        </p:cTn>
+                                        <p:tgtEl>
+                                          <p:spTgt spid="104"/>
+                                        </p:tgtEl>
+                                        <p:attrNameLst>
+                                          <p:attrName>style.visibility</p:attrName>
+                                        </p:attrNameLst>
+                                      </p:cBhvr>
+                                      <p:to>
+                                        <p:strVal val="visible"/>
+                                      </p:to>
+                                    </p:set>
+                                  </p:childTnLst>
+                                </p:cTn>
+                              </p:par>
+                              <p:par>
+                                <p:cTn id="37" presetID="1" presetClass="entr" presetSubtype="0" fill="hold" nodeType="withEffect">
+                                  <p:stCondLst>
+                                    <p:cond delay="0"/>
+                                  </p:stCondLst>
+                                  <p:childTnLst>
+                                    <p:set>
+                                      <p:cBhvr>
+                                        <p:cTn id="38" dur="1" fill="hold">
+                                          <p:stCondLst>
+                                            <p:cond delay="0"/>
+                                          </p:stCondLst>
+                                        </p:cTn>
+                                        <p:tgtEl>
+                                          <p:spTgt spid="74"/>
+                                        </p:tgtEl>
+                                        <p:attrNameLst>
+                                          <p:attrName>style.visibility</p:attrName>
+                                        </p:attrNameLst>
+                                      </p:cBhvr>
+                                      <p:to>
+                                        <p:strVal val="visible"/>
+                                      </p:to>
+                                    </p:set>
+                                  </p:childTnLst>
+                                </p:cTn>
+                              </p:par>
+                              <p:par>
+                                <p:cTn id="39" presetID="1" presetClass="entr" presetSubtype="0" fill="hold" nodeType="withEffect">
+                                  <p:stCondLst>
+                                    <p:cond delay="0"/>
+                                  </p:stCondLst>
+                                  <p:childTnLst>
+                                    <p:set>
+                                      <p:cBhvr>
+                                        <p:cTn id="40" dur="1" fill="hold">
+                                          <p:stCondLst>
+                                            <p:cond delay="0"/>
+                                          </p:stCondLst>
+                                        </p:cTn>
+                                        <p:tgtEl>
+                                          <p:spTgt spid="79"/>
+                                        </p:tgtEl>
+                                        <p:attrNameLst>
+                                          <p:attrName>style.visibility</p:attrName>
+                                        </p:attrNameLst>
+                                      </p:cBhvr>
+                                      <p:to>
+                                        <p:strVal val="visible"/>
+                                      </p:to>
+                                    </p:set>
+                                  </p:childTnLst>
+                                </p:cTn>
+                              </p:par>
+                            </p:childTnLst>
+                          </p:cTn>
+                        </p:par>
+                      </p:childTnLst>
+                    </p:cTn>
+                  </p:par>
+                  <p:par>
+                    <p:cTn id="41" fill="hold">
+                      <p:stCondLst>
+                        <p:cond delay="indefinite"/>
+                      </p:stCondLst>
+                      <p:childTnLst>
+                        <p:par>
+                          <p:cTn id="42" fill="hold">
+                            <p:stCondLst>
+                              <p:cond delay="0"/>
+                            </p:stCondLst>
+                            <p:childTnLst>
+                              <p:par>
+                                <p:cTn id="43" presetID="1" presetClass="entr" presetSubtype="0" fill="hold" nodeType="clickEffect">
+                                  <p:stCondLst>
+                                    <p:cond delay="0"/>
+                                  </p:stCondLst>
+                                  <p:childTnLst>
+                                    <p:set>
+                                      <p:cBhvr>
+                                        <p:cTn id="44" dur="1" fill="hold">
+                                          <p:stCondLst>
+                                            <p:cond delay="0"/>
+                                          </p:stCondLst>
+                                        </p:cTn>
+                                        <p:tgtEl>
+                                          <p:spTgt spid="99"/>
+                                        </p:tgtEl>
+                                        <p:attrNameLst>
+                                          <p:attrName>style.visibility</p:attrName>
+                                        </p:attrNameLst>
+                                      </p:cBhvr>
+                                      <p:to>
+                                        <p:strVal val="visible"/>
+                                      </p:to>
+                                    </p:set>
+                                  </p:childTnLst>
+                                </p:cTn>
+                              </p:par>
+                              <p:par>
+                                <p:cTn id="45" presetID="1" presetClass="entr" presetSubtype="0" fill="hold" grpId="0" nodeType="withEffect">
+                                  <p:stCondLst>
+                                    <p:cond delay="0"/>
+                                  </p:stCondLst>
+                                  <p:childTnLst>
+                                    <p:set>
+                                      <p:cBhvr>
+                                        <p:cTn id="46" dur="1" fill="hold">
+                                          <p:stCondLst>
+                                            <p:cond delay="0"/>
+                                          </p:stCondLst>
+                                        </p:cTn>
+                                        <p:tgtEl>
+                                          <p:spTgt spid="105"/>
+                                        </p:tgtEl>
+                                        <p:attrNameLst>
+                                          <p:attrName>style.visibility</p:attrName>
+                                        </p:attrNameLst>
+                                      </p:cBhvr>
+                                      <p:to>
+                                        <p:strVal val="visible"/>
+                                      </p:to>
+                                    </p:set>
+                                  </p:childTnLst>
+                                </p:cTn>
+                              </p:par>
+                              <p:par>
+                                <p:cTn id="47" presetID="1" presetClass="entr" presetSubtype="0" fill="hold" nodeType="withEffect">
+                                  <p:stCondLst>
+                                    <p:cond delay="0"/>
+                                  </p:stCondLst>
+                                  <p:childTnLst>
+                                    <p:set>
+                                      <p:cBhvr>
+                                        <p:cTn id="48" dur="1" fill="hold">
+                                          <p:stCondLst>
+                                            <p:cond delay="0"/>
+                                          </p:stCondLst>
+                                        </p:cTn>
+                                        <p:tgtEl>
+                                          <p:spTgt spid="81"/>
+                                        </p:tgtEl>
+                                        <p:attrNameLst>
+                                          <p:attrName>style.visibility</p:attrName>
+                                        </p:attrNameLst>
+                                      </p:cBhvr>
+                                      <p:to>
+                                        <p:strVal val="visible"/>
+                                      </p:to>
+                                    </p:set>
+                                  </p:childTnLst>
+                                </p:cTn>
+                              </p:par>
+                            </p:childTnLst>
+                          </p:cTn>
+                        </p:par>
+                      </p:childTnLst>
+                    </p:cTn>
+                  </p:par>
+                  <p:par>
+                    <p:cTn id="49" fill="hold">
+                      <p:stCondLst>
+                        <p:cond delay="indefinite"/>
+                      </p:stCondLst>
+                      <p:childTnLst>
+                        <p:par>
+                          <p:cTn id="50" fill="hold">
+                            <p:stCondLst>
+                              <p:cond delay="0"/>
+                            </p:stCondLst>
+                            <p:childTnLst>
+                              <p:par>
+                                <p:cTn id="51" presetID="1" presetClass="entr" presetSubtype="0" fill="hold" grpId="0" nodeType="clickEffect">
+                                  <p:stCondLst>
+                                    <p:cond delay="0"/>
+                                  </p:stCondLst>
+                                  <p:childTnLst>
+                                    <p:set>
+                                      <p:cBhvr>
+                                        <p:cTn id="52" dur="1" fill="hold">
+                                          <p:stCondLst>
+                                            <p:cond delay="0"/>
+                                          </p:stCondLst>
+                                        </p:cTn>
+                                        <p:tgtEl>
+                                          <p:spTgt spid="106"/>
+                                        </p:tgtEl>
+                                        <p:attrNameLst>
+                                          <p:attrName>style.visibility</p:attrName>
+                                        </p:attrNameLst>
+                                      </p:cBhvr>
+                                      <p:to>
+                                        <p:strVal val="visible"/>
+                                      </p:to>
+                                    </p:set>
+                                  </p:childTnLst>
+                                </p:cTn>
+                              </p:par>
+                              <p:par>
+                                <p:cTn id="53" presetID="1" presetClass="entr" presetSubtype="0" fill="hold" nodeType="withEffect">
+                                  <p:stCondLst>
+                                    <p:cond delay="0"/>
+                                  </p:stCondLst>
+                                  <p:childTnLst>
+                                    <p:set>
+                                      <p:cBhvr>
+                                        <p:cTn id="54" dur="1" fill="hold">
+                                          <p:stCondLst>
+                                            <p:cond delay="0"/>
+                                          </p:stCondLst>
+                                        </p:cTn>
+                                        <p:tgtEl>
+                                          <p:spTgt spid="80"/>
+                                        </p:tgtEl>
+                                        <p:attrNameLst>
+                                          <p:attrName>style.visibility</p:attrName>
+                                        </p:attrNameLst>
+                                      </p:cBhvr>
+                                      <p:to>
+                                        <p:strVal val="visible"/>
+                                      </p:to>
+                                    </p:set>
+                                  </p:childTnLst>
+                                </p:cTn>
+                              </p:par>
+                              <p:par>
+                                <p:cTn id="55" presetID="1" presetClass="entr" presetSubtype="0" fill="hold" nodeType="withEffect">
+                                  <p:stCondLst>
+                                    <p:cond delay="0"/>
+                                  </p:stCondLst>
+                                  <p:childTnLst>
+                                    <p:set>
+                                      <p:cBhvr>
+                                        <p:cTn id="56" dur="1" fill="hold">
+                                          <p:stCondLst>
+                                            <p:cond delay="0"/>
+                                          </p:stCondLst>
+                                        </p:cTn>
+                                        <p:tgtEl>
+                                          <p:spTgt spid="59"/>
+                                        </p:tgtEl>
+                                        <p:attrNameLst>
+                                          <p:attrName>style.visibility</p:attrName>
+                                        </p:attrNameLst>
+                                      </p:cBhvr>
+                                      <p:to>
+                                        <p:strVal val="visible"/>
+                                      </p:to>
+                                    </p:set>
+                                  </p:childTnLst>
+                                </p:cTn>
+                              </p:par>
+                            </p:childTnLst>
+                          </p:cTn>
+                        </p:par>
+                      </p:childTnLst>
+                    </p:cTn>
+                  </p:par>
+                  <p:par>
+                    <p:cTn id="57" fill="hold">
+                      <p:stCondLst>
+                        <p:cond delay="indefinite"/>
+                      </p:stCondLst>
+                      <p:childTnLst>
+                        <p:par>
+                          <p:cTn id="58" fill="hold">
+                            <p:stCondLst>
+                              <p:cond delay="0"/>
+                            </p:stCondLst>
+                            <p:childTnLst>
+                              <p:par>
+                                <p:cTn id="59" presetID="1" presetClass="entr" presetSubtype="0" fill="hold" grpId="0" nodeType="clickEffect">
+                                  <p:stCondLst>
+                                    <p:cond delay="0"/>
+                                  </p:stCondLst>
+                                  <p:childTnLst>
+                                    <p:set>
+                                      <p:cBhvr>
+                                        <p:cTn id="60" dur="1" fill="hold">
+                                          <p:stCondLst>
+                                            <p:cond delay="0"/>
+                                          </p:stCondLst>
+                                        </p:cTn>
+                                        <p:tgtEl>
+                                          <p:spTgt spid="107"/>
+                                        </p:tgtEl>
+                                        <p:attrNameLst>
+                                          <p:attrName>style.visibility</p:attrName>
+                                        </p:attrNameLst>
+                                      </p:cBhvr>
+                                      <p:to>
+                                        <p:strVal val="visible"/>
+                                      </p:to>
+                                    </p:set>
+                                  </p:childTnLst>
+                                </p:cTn>
+                              </p:par>
+                              <p:par>
+                                <p:cTn id="61" presetID="1" presetClass="entr" presetSubtype="0" fill="hold" nodeType="withEffect">
+                                  <p:stCondLst>
+                                    <p:cond delay="0"/>
+                                  </p:stCondLst>
+                                  <p:childTnLst>
+                                    <p:set>
+                                      <p:cBhvr>
+                                        <p:cTn id="62" dur="1" fill="hold">
+                                          <p:stCondLst>
+                                            <p:cond delay="0"/>
+                                          </p:stCondLst>
+                                        </p:cTn>
+                                        <p:tgtEl>
+                                          <p:spTgt spid="92"/>
+                                        </p:tgtEl>
+                                        <p:attrNameLst>
+                                          <p:attrName>style.visibility</p:attrName>
+                                        </p:attrNameLst>
+                                      </p:cBhvr>
+                                      <p:to>
+                                        <p:strVal val="visible"/>
+                                      </p:to>
+                                    </p:set>
+                                  </p:childTnLst>
+                                </p:cTn>
+                              </p:par>
+                              <p:par>
+                                <p:cTn id="63" presetID="1" presetClass="entr" presetSubtype="0" fill="hold" nodeType="withEffect">
+                                  <p:stCondLst>
+                                    <p:cond delay="0"/>
+                                  </p:stCondLst>
+                                  <p:childTnLst>
+                                    <p:set>
+                                      <p:cBhvr>
+                                        <p:cTn id="64" dur="1" fill="hold">
+                                          <p:stCondLst>
+                                            <p:cond delay="0"/>
+                                          </p:stCondLst>
+                                        </p:cTn>
+                                        <p:tgtEl>
+                                          <p:spTgt spid="95"/>
+                                        </p:tgtEl>
+                                        <p:attrNameLst>
+                                          <p:attrName>style.visibility</p:attrName>
+                                        </p:attrNameLst>
+                                      </p:cBhvr>
+                                      <p:to>
+                                        <p:strVal val="visible"/>
+                                      </p:to>
+                                    </p:set>
+                                  </p:childTnLst>
+                                </p:cTn>
+                              </p:par>
+                            </p:childTnLst>
+                          </p:cTn>
+                        </p:par>
+                      </p:childTnLst>
+                    </p:cTn>
+                  </p:par>
+                </p:childTnLst>
+              </p:cTn>
+              <p:prevCondLst>
+                <p:cond evt="onPrev" delay="0">
+                  <p:tgtEl>
+                    <p:sldTgt/>
+                  </p:tgtEl>
+                </p:cond>
+              </p:prevCondLst>
+              <p:nextCondLst>
+                <p:cond evt="onNext" delay="0">
+                  <p:tgtEl>
+                    <p:sldTgt/>
+                  </p:tgtEl>
+                </p:cond>
+              </p:nextCondLst>
+            </p:seq>
+          </p:childTnLst>
+        </p:cTn>
+      </p:par>
+    </p:tnLst>
+    <p:bldLst>
+      <p:bldP spid="102" grpId="0" animBg="1"/>
+      <p:bldP spid="103" grpId="0" animBg="1"/>
+      <p:bldP spid="104" grpId="0" animBg="1"/>
+      <p:bldP spid="105" grpId="0" animBg="1"/>
+      <p:bldP spid="106" grpId="0" animBg="1"/>
+      <p:bldP spid="107" grpId="0" animBg="1"/>
+    </p:bldLst>
+  </p:timing>
 </p:sld>
 </file>
 

</xml_diff>